<commit_message>
0225 updated prevabs doc
</commit_message>
<xml_diff>
--- a/docs/source/prevabs/figures/Presentation1.pptx
+++ b/docs/source/prevabs/figures/Presentation1.pptx
@@ -6,7 +6,9 @@
   </p:sldMasterIdLst>
   <p:sldIdLst>
     <p:sldId id="256" r:id="rId2"/>
-    <p:sldId id="257" r:id="rId3"/>
+    <p:sldId id="258" r:id="rId3"/>
+    <p:sldId id="259" r:id="rId4"/>
+    <p:sldId id="257" r:id="rId5"/>
   </p:sldIdLst>
   <p:sldSz cx="12192000" cy="6858000"/>
   <p:notesSz cx="6858000" cy="9144000"/>
@@ -105,6 +107,11 @@
       </a:defRPr>
     </a:lvl9pPr>
   </p:defaultTextStyle>
+  <p:extLst>
+    <p:ext uri="{EFAFB233-063F-42B5-8137-9DF3F51BA10A}">
+      <p15:sldGuideLst xmlns:p15="http://schemas.microsoft.com/office/powerpoint/2012/main"/>
+    </p:ext>
+  </p:extLst>
 </p:presentation>
 </file>
 
@@ -3905,7 +3912,7 @@
           <a:p>
             <a:fld id="{5728F4A5-C901-49E6-A397-6F90A35E2E47}" type="datetimeFigureOut">
               <a:rPr lang="en-US" smtClean="0"/>
-              <a:t>7/19/2019</a:t>
+              <a:t>2/24/2021</a:t>
             </a:fld>
             <a:endParaRPr lang="en-US"/>
           </a:p>
@@ -4103,7 +4110,7 @@
           <a:p>
             <a:fld id="{5728F4A5-C901-49E6-A397-6F90A35E2E47}" type="datetimeFigureOut">
               <a:rPr lang="en-US" smtClean="0"/>
-              <a:t>7/19/2019</a:t>
+              <a:t>2/24/2021</a:t>
             </a:fld>
             <a:endParaRPr lang="en-US"/>
           </a:p>
@@ -4311,7 +4318,7 @@
           <a:p>
             <a:fld id="{5728F4A5-C901-49E6-A397-6F90A35E2E47}" type="datetimeFigureOut">
               <a:rPr lang="en-US" smtClean="0"/>
-              <a:t>7/19/2019</a:t>
+              <a:t>2/24/2021</a:t>
             </a:fld>
             <a:endParaRPr lang="en-US"/>
           </a:p>
@@ -4509,7 +4516,7 @@
           <a:p>
             <a:fld id="{5728F4A5-C901-49E6-A397-6F90A35E2E47}" type="datetimeFigureOut">
               <a:rPr lang="en-US" smtClean="0"/>
-              <a:t>7/19/2019</a:t>
+              <a:t>2/24/2021</a:t>
             </a:fld>
             <a:endParaRPr lang="en-US"/>
           </a:p>
@@ -4784,7 +4791,7 @@
           <a:p>
             <a:fld id="{5728F4A5-C901-49E6-A397-6F90A35E2E47}" type="datetimeFigureOut">
               <a:rPr lang="en-US" smtClean="0"/>
-              <a:t>7/19/2019</a:t>
+              <a:t>2/24/2021</a:t>
             </a:fld>
             <a:endParaRPr lang="en-US"/>
           </a:p>
@@ -5049,7 +5056,7 @@
           <a:p>
             <a:fld id="{5728F4A5-C901-49E6-A397-6F90A35E2E47}" type="datetimeFigureOut">
               <a:rPr lang="en-US" smtClean="0"/>
-              <a:t>7/19/2019</a:t>
+              <a:t>2/24/2021</a:t>
             </a:fld>
             <a:endParaRPr lang="en-US"/>
           </a:p>
@@ -5461,7 +5468,7 @@
           <a:p>
             <a:fld id="{5728F4A5-C901-49E6-A397-6F90A35E2E47}" type="datetimeFigureOut">
               <a:rPr lang="en-US" smtClean="0"/>
-              <a:t>7/19/2019</a:t>
+              <a:t>2/24/2021</a:t>
             </a:fld>
             <a:endParaRPr lang="en-US"/>
           </a:p>
@@ -5602,7 +5609,7 @@
           <a:p>
             <a:fld id="{5728F4A5-C901-49E6-A397-6F90A35E2E47}" type="datetimeFigureOut">
               <a:rPr lang="en-US" smtClean="0"/>
-              <a:t>7/19/2019</a:t>
+              <a:t>2/24/2021</a:t>
             </a:fld>
             <a:endParaRPr lang="en-US"/>
           </a:p>
@@ -5715,7 +5722,7 @@
           <a:p>
             <a:fld id="{5728F4A5-C901-49E6-A397-6F90A35E2E47}" type="datetimeFigureOut">
               <a:rPr lang="en-US" smtClean="0"/>
-              <a:t>7/19/2019</a:t>
+              <a:t>2/24/2021</a:t>
             </a:fld>
             <a:endParaRPr lang="en-US"/>
           </a:p>
@@ -6026,7 +6033,7 @@
           <a:p>
             <a:fld id="{5728F4A5-C901-49E6-A397-6F90A35E2E47}" type="datetimeFigureOut">
               <a:rPr lang="en-US" smtClean="0"/>
-              <a:t>7/19/2019</a:t>
+              <a:t>2/24/2021</a:t>
             </a:fld>
             <a:endParaRPr lang="en-US"/>
           </a:p>
@@ -6314,7 +6321,7 @@
           <a:p>
             <a:fld id="{5728F4A5-C901-49E6-A397-6F90A35E2E47}" type="datetimeFigureOut">
               <a:rPr lang="en-US" smtClean="0"/>
-              <a:t>7/19/2019</a:t>
+              <a:t>2/24/2021</a:t>
             </a:fld>
             <a:endParaRPr lang="en-US"/>
           </a:p>
@@ -6555,7 +6562,7 @@
           <a:p>
             <a:fld id="{5728F4A5-C901-49E6-A397-6F90A35E2E47}" type="datetimeFigureOut">
               <a:rPr lang="en-US" smtClean="0"/>
-              <a:t>7/19/2019</a:t>
+              <a:t>2/24/2021</a:t>
             </a:fld>
             <a:endParaRPr lang="en-US"/>
           </a:p>
@@ -7030,6 +7037,3703 @@
           <a:chExt cx="0" cy="0"/>
         </a:xfrm>
       </p:grpSpPr>
+      <p:grpSp>
+        <p:nvGrpSpPr>
+          <p:cNvPr id="32" name="Group 31">
+            <a:extLst>
+              <a:ext uri="{FF2B5EF4-FFF2-40B4-BE49-F238E27FC236}">
+                <a16:creationId xmlns:a16="http://schemas.microsoft.com/office/drawing/2014/main" id="{AD9582EC-0F7F-465E-B541-08E9A9842402}"/>
+              </a:ext>
+            </a:extLst>
+          </p:cNvPr>
+          <p:cNvGrpSpPr/>
+          <p:nvPr/>
+        </p:nvGrpSpPr>
+        <p:grpSpPr>
+          <a:xfrm>
+            <a:off x="2695048" y="1983043"/>
+            <a:ext cx="7295881" cy="2507638"/>
+            <a:chOff x="2695048" y="1983043"/>
+            <a:chExt cx="7295881" cy="2507638"/>
+          </a:xfrm>
+        </p:grpSpPr>
+        <p:sp>
+          <p:nvSpPr>
+            <p:cNvPr id="5" name="Freeform: Shape 4">
+              <a:extLst>
+                <a:ext uri="{FF2B5EF4-FFF2-40B4-BE49-F238E27FC236}">
+                  <a16:creationId xmlns:a16="http://schemas.microsoft.com/office/drawing/2014/main" id="{7DDDF06A-788B-489A-9DF6-BB0F250E2486}"/>
+                </a:ext>
+              </a:extLst>
+            </p:cNvPr>
+            <p:cNvSpPr/>
+            <p:nvPr/>
+          </p:nvSpPr>
+          <p:spPr>
+            <a:xfrm>
+              <a:off x="3476626" y="2368115"/>
+              <a:ext cx="5619750" cy="926143"/>
+            </a:xfrm>
+            <a:custGeom>
+              <a:avLst/>
+              <a:gdLst>
+                <a:gd name="connsiteX0" fmla="*/ 0 w 8029575"/>
+                <a:gd name="connsiteY0" fmla="*/ 784811 h 1359609"/>
+                <a:gd name="connsiteX1" fmla="*/ 3838575 w 8029575"/>
+                <a:gd name="connsiteY1" fmla="*/ 13286 h 1359609"/>
+                <a:gd name="connsiteX2" fmla="*/ 6343650 w 8029575"/>
+                <a:gd name="connsiteY2" fmla="*/ 1356311 h 1359609"/>
+                <a:gd name="connsiteX3" fmla="*/ 8029575 w 8029575"/>
+                <a:gd name="connsiteY3" fmla="*/ 318086 h 1359609"/>
+                <a:gd name="connsiteX0" fmla="*/ 0 w 6867525"/>
+                <a:gd name="connsiteY0" fmla="*/ 767024 h 1360872"/>
+                <a:gd name="connsiteX1" fmla="*/ 2676525 w 6867525"/>
+                <a:gd name="connsiteY1" fmla="*/ 14549 h 1360872"/>
+                <a:gd name="connsiteX2" fmla="*/ 5181600 w 6867525"/>
+                <a:gd name="connsiteY2" fmla="*/ 1357574 h 1360872"/>
+                <a:gd name="connsiteX3" fmla="*/ 6867525 w 6867525"/>
+                <a:gd name="connsiteY3" fmla="*/ 319349 h 1360872"/>
+                <a:gd name="connsiteX0" fmla="*/ 0 w 6362700"/>
+                <a:gd name="connsiteY0" fmla="*/ 714261 h 1365259"/>
+                <a:gd name="connsiteX1" fmla="*/ 2171700 w 6362700"/>
+                <a:gd name="connsiteY1" fmla="*/ 18936 h 1365259"/>
+                <a:gd name="connsiteX2" fmla="*/ 4676775 w 6362700"/>
+                <a:gd name="connsiteY2" fmla="*/ 1361961 h 1365259"/>
+                <a:gd name="connsiteX3" fmla="*/ 6362700 w 6362700"/>
+                <a:gd name="connsiteY3" fmla="*/ 323736 h 1365259"/>
+                <a:gd name="connsiteX0" fmla="*/ 0 w 6362700"/>
+                <a:gd name="connsiteY0" fmla="*/ 716644 h 1367642"/>
+                <a:gd name="connsiteX1" fmla="*/ 2171700 w 6362700"/>
+                <a:gd name="connsiteY1" fmla="*/ 21319 h 1367642"/>
+                <a:gd name="connsiteX2" fmla="*/ 4676775 w 6362700"/>
+                <a:gd name="connsiteY2" fmla="*/ 1364344 h 1367642"/>
+                <a:gd name="connsiteX3" fmla="*/ 6362700 w 6362700"/>
+                <a:gd name="connsiteY3" fmla="*/ 326119 h 1367642"/>
+                <a:gd name="connsiteX0" fmla="*/ 0 w 6362700"/>
+                <a:gd name="connsiteY0" fmla="*/ 699211 h 938158"/>
+                <a:gd name="connsiteX1" fmla="*/ 2171700 w 6362700"/>
+                <a:gd name="connsiteY1" fmla="*/ 3886 h 938158"/>
+                <a:gd name="connsiteX2" fmla="*/ 4048125 w 6362700"/>
+                <a:gd name="connsiteY2" fmla="*/ 927811 h 938158"/>
+                <a:gd name="connsiteX3" fmla="*/ 6362700 w 6362700"/>
+                <a:gd name="connsiteY3" fmla="*/ 308686 h 938158"/>
+                <a:gd name="connsiteX0" fmla="*/ 0 w 5619750"/>
+                <a:gd name="connsiteY0" fmla="*/ 699211 h 935658"/>
+                <a:gd name="connsiteX1" fmla="*/ 2171700 w 5619750"/>
+                <a:gd name="connsiteY1" fmla="*/ 3886 h 935658"/>
+                <a:gd name="connsiteX2" fmla="*/ 4048125 w 5619750"/>
+                <a:gd name="connsiteY2" fmla="*/ 927811 h 935658"/>
+                <a:gd name="connsiteX3" fmla="*/ 5619750 w 5619750"/>
+                <a:gd name="connsiteY3" fmla="*/ 242011 h 935658"/>
+                <a:gd name="connsiteX0" fmla="*/ 0 w 5619750"/>
+                <a:gd name="connsiteY0" fmla="*/ 698933 h 926143"/>
+                <a:gd name="connsiteX1" fmla="*/ 2171700 w 5619750"/>
+                <a:gd name="connsiteY1" fmla="*/ 3608 h 926143"/>
+                <a:gd name="connsiteX2" fmla="*/ 3743325 w 5619750"/>
+                <a:gd name="connsiteY2" fmla="*/ 918008 h 926143"/>
+                <a:gd name="connsiteX3" fmla="*/ 5619750 w 5619750"/>
+                <a:gd name="connsiteY3" fmla="*/ 241733 h 926143"/>
+              </a:gdLst>
+              <a:ahLst/>
+              <a:cxnLst>
+                <a:cxn ang="0">
+                  <a:pos x="connsiteX0" y="connsiteY0"/>
+                </a:cxn>
+                <a:cxn ang="0">
+                  <a:pos x="connsiteX1" y="connsiteY1"/>
+                </a:cxn>
+                <a:cxn ang="0">
+                  <a:pos x="connsiteX2" y="connsiteY2"/>
+                </a:cxn>
+                <a:cxn ang="0">
+                  <a:pos x="connsiteX3" y="connsiteY3"/>
+                </a:cxn>
+              </a:cxnLst>
+              <a:rect l="l" t="t" r="r" b="b"/>
+              <a:pathLst>
+                <a:path w="5619750" h="926143">
+                  <a:moveTo>
+                    <a:pt x="0" y="698933"/>
+                  </a:moveTo>
+                  <a:cubicBezTo>
+                    <a:pt x="838200" y="208395"/>
+                    <a:pt x="1547813" y="-32904"/>
+                    <a:pt x="2171700" y="3608"/>
+                  </a:cubicBezTo>
+                  <a:cubicBezTo>
+                    <a:pt x="2795587" y="40120"/>
+                    <a:pt x="3044825" y="867208"/>
+                    <a:pt x="3743325" y="918008"/>
+                  </a:cubicBezTo>
+                  <a:cubicBezTo>
+                    <a:pt x="4441825" y="968808"/>
+                    <a:pt x="5126037" y="786245"/>
+                    <a:pt x="5619750" y="241733"/>
+                  </a:cubicBezTo>
+                </a:path>
+              </a:pathLst>
+            </a:custGeom>
+            <a:ln/>
+          </p:spPr>
+          <p:style>
+            <a:lnRef idx="3">
+              <a:schemeClr val="dk1"/>
+            </a:lnRef>
+            <a:fillRef idx="0">
+              <a:schemeClr val="dk1"/>
+            </a:fillRef>
+            <a:effectRef idx="2">
+              <a:schemeClr val="dk1"/>
+            </a:effectRef>
+            <a:fontRef idx="minor">
+              <a:schemeClr val="tx1"/>
+            </a:fontRef>
+          </p:style>
+          <p:txBody>
+            <a:bodyPr rtlCol="0" anchor="ctr"/>
+            <a:lstStyle/>
+            <a:p>
+              <a:pPr algn="ctr"/>
+              <a:endParaRPr lang="en-US"/>
+            </a:p>
+          </p:txBody>
+        </p:sp>
+        <p:sp>
+          <p:nvSpPr>
+            <p:cNvPr id="6" name="TextBox 5">
+              <a:extLst>
+                <a:ext uri="{FF2B5EF4-FFF2-40B4-BE49-F238E27FC236}">
+                  <a16:creationId xmlns:a16="http://schemas.microsoft.com/office/drawing/2014/main" id="{51406831-CCF2-4FB0-B6B6-8CBF6BE003ED}"/>
+                </a:ext>
+              </a:extLst>
+            </p:cNvPr>
+            <p:cNvSpPr txBox="1"/>
+            <p:nvPr/>
+          </p:nvSpPr>
+          <p:spPr>
+            <a:xfrm>
+              <a:off x="5177558" y="1983043"/>
+              <a:ext cx="256802" cy="369332"/>
+            </a:xfrm>
+            <a:prstGeom prst="rect">
+              <a:avLst/>
+            </a:prstGeom>
+            <a:noFill/>
+          </p:spPr>
+          <p:txBody>
+            <a:bodyPr wrap="none" rtlCol="0">
+              <a:spAutoFit/>
+            </a:bodyPr>
+            <a:lstStyle/>
+            <a:p>
+              <a:r>
+                <a:rPr lang="en-US" i="1" dirty="0">
+                  <a:latin typeface="Noto Serif" panose="02020502060505020204" pitchFamily="18"/>
+                  <a:ea typeface="Noto Serif" panose="02020502060505020204" pitchFamily="18"/>
+                  <a:cs typeface="Noto Serif" panose="02020502060505020204" pitchFamily="18"/>
+                </a:rPr>
+                <a:t>l</a:t>
+              </a:r>
+            </a:p>
+          </p:txBody>
+        </p:sp>
+        <p:sp>
+          <p:nvSpPr>
+            <p:cNvPr id="7" name="Oval 6">
+              <a:extLst>
+                <a:ext uri="{FF2B5EF4-FFF2-40B4-BE49-F238E27FC236}">
+                  <a16:creationId xmlns:a16="http://schemas.microsoft.com/office/drawing/2014/main" id="{FEA8774B-9F40-4C07-8765-F7D5513B464E}"/>
+                </a:ext>
+              </a:extLst>
+            </p:cNvPr>
+            <p:cNvSpPr>
+              <a:spLocks noChangeAspect="1"/>
+            </p:cNvSpPr>
+            <p:nvPr/>
+          </p:nvSpPr>
+          <p:spPr>
+            <a:xfrm>
+              <a:off x="3430906" y="3019425"/>
+              <a:ext cx="91440" cy="91440"/>
+            </a:xfrm>
+            <a:prstGeom prst="ellipse">
+              <a:avLst/>
+            </a:prstGeom>
+            <a:solidFill>
+              <a:schemeClr val="dk1"/>
+            </a:solidFill>
+            <a:ln>
+              <a:noFill/>
+            </a:ln>
+          </p:spPr>
+          <p:style>
+            <a:lnRef idx="0">
+              <a:scrgbClr r="0" g="0" b="0"/>
+            </a:lnRef>
+            <a:fillRef idx="0">
+              <a:scrgbClr r="0" g="0" b="0"/>
+            </a:fillRef>
+            <a:effectRef idx="0">
+              <a:scrgbClr r="0" g="0" b="0"/>
+            </a:effectRef>
+            <a:fontRef idx="minor">
+              <a:schemeClr val="lt1"/>
+            </a:fontRef>
+          </p:style>
+          <p:txBody>
+            <a:bodyPr rtlCol="0" anchor="ctr"/>
+            <a:lstStyle/>
+            <a:p>
+              <a:pPr algn="ctr"/>
+              <a:endParaRPr lang="en-US"/>
+            </a:p>
+          </p:txBody>
+        </p:sp>
+        <p:sp>
+          <p:nvSpPr>
+            <p:cNvPr id="8" name="Oval 7">
+              <a:extLst>
+                <a:ext uri="{FF2B5EF4-FFF2-40B4-BE49-F238E27FC236}">
+                  <a16:creationId xmlns:a16="http://schemas.microsoft.com/office/drawing/2014/main" id="{5B4CB6A1-24AA-46A3-9E1F-2F0A035BE6D5}"/>
+                </a:ext>
+              </a:extLst>
+            </p:cNvPr>
+            <p:cNvSpPr>
+              <a:spLocks noChangeAspect="1"/>
+            </p:cNvSpPr>
+            <p:nvPr/>
+          </p:nvSpPr>
+          <p:spPr>
+            <a:xfrm>
+              <a:off x="9050656" y="2571750"/>
+              <a:ext cx="91440" cy="91440"/>
+            </a:xfrm>
+            <a:prstGeom prst="ellipse">
+              <a:avLst/>
+            </a:prstGeom>
+            <a:solidFill>
+              <a:schemeClr val="dk1"/>
+            </a:solidFill>
+            <a:ln>
+              <a:noFill/>
+            </a:ln>
+          </p:spPr>
+          <p:style>
+            <a:lnRef idx="0">
+              <a:scrgbClr r="0" g="0" b="0"/>
+            </a:lnRef>
+            <a:fillRef idx="0">
+              <a:scrgbClr r="0" g="0" b="0"/>
+            </a:fillRef>
+            <a:effectRef idx="0">
+              <a:scrgbClr r="0" g="0" b="0"/>
+            </a:effectRef>
+            <a:fontRef idx="minor">
+              <a:schemeClr val="lt1"/>
+            </a:fontRef>
+          </p:style>
+          <p:txBody>
+            <a:bodyPr rtlCol="0" anchor="ctr"/>
+            <a:lstStyle/>
+            <a:p>
+              <a:pPr algn="ctr"/>
+              <a:endParaRPr lang="en-US"/>
+            </a:p>
+          </p:txBody>
+        </p:sp>
+        <mc:AlternateContent xmlns:mc="http://schemas.openxmlformats.org/markup-compatibility/2006">
+          <mc:Choice xmlns:a14="http://schemas.microsoft.com/office/drawing/2010/main" Requires="a14">
+            <p:sp>
+              <p:nvSpPr>
+                <p:cNvPr id="9" name="TextBox 8">
+                  <a:extLst>
+                    <a:ext uri="{FF2B5EF4-FFF2-40B4-BE49-F238E27FC236}">
+                      <a16:creationId xmlns:a16="http://schemas.microsoft.com/office/drawing/2014/main" id="{912F311E-AFF2-451A-863E-849C0F10C5ED}"/>
+                    </a:ext>
+                  </a:extLst>
+                </p:cNvPr>
+                <p:cNvSpPr txBox="1"/>
+                <p:nvPr/>
+              </p:nvSpPr>
+              <p:spPr>
+                <a:xfrm>
+                  <a:off x="2695048" y="3135659"/>
+                  <a:ext cx="1067856" cy="404983"/>
+                </a:xfrm>
+                <a:prstGeom prst="rect">
+                  <a:avLst/>
+                </a:prstGeom>
+                <a:noFill/>
+              </p:spPr>
+              <p:txBody>
+                <a:bodyPr wrap="none" rtlCol="0">
+                  <a:spAutoFit/>
+                </a:bodyPr>
+                <a:lstStyle/>
+                <a:p>
+                  <a14:m>
+                    <m:oMathPara xmlns:m="http://schemas.openxmlformats.org/officeDocument/2006/math">
+                      <m:oMathParaPr>
+                        <m:jc m:val="centerGroup"/>
+                      </m:oMathParaPr>
+                      <m:oMath xmlns:m="http://schemas.openxmlformats.org/officeDocument/2006/math">
+                        <m:d>
+                          <m:dPr>
+                            <m:ctrlPr>
+                              <a:rPr lang="en-US" b="0" i="1" smtClean="0">
+                                <a:latin typeface="Cambria Math" panose="02040503050406030204" pitchFamily="18" charset="0"/>
+                                <a:ea typeface="Noto Serif" panose="02020502060505020204" pitchFamily="18"/>
+                                <a:cs typeface="Noto Serif" panose="02020502060505020204" pitchFamily="18"/>
+                              </a:rPr>
+                            </m:ctrlPr>
+                          </m:dPr>
+                          <m:e>
+                            <m:sSubSup>
+                              <m:sSubSupPr>
+                                <m:ctrlPr>
+                                  <a:rPr lang="en-US" b="0" i="1" smtClean="0">
+                                    <a:latin typeface="Cambria Math" panose="02040503050406030204" pitchFamily="18" charset="0"/>
+                                    <a:ea typeface="Noto Serif" panose="02020502060505020204" pitchFamily="18"/>
+                                    <a:cs typeface="Noto Serif" panose="02020502060505020204" pitchFamily="18"/>
+                                  </a:rPr>
+                                </m:ctrlPr>
+                              </m:sSubSupPr>
+                              <m:e>
+                                <m:r>
+                                  <a:rPr lang="en-US" b="0" i="1" smtClean="0">
+                                    <a:latin typeface="Cambria Math" panose="02040503050406030204" pitchFamily="18" charset="0"/>
+                                    <a:ea typeface="Noto Serif" panose="02020502060505020204" pitchFamily="18"/>
+                                    <a:cs typeface="Noto Serif" panose="02020502060505020204" pitchFamily="18"/>
+                                  </a:rPr>
+                                  <m:t>𝑥</m:t>
+                                </m:r>
+                              </m:e>
+                              <m:sub>
+                                <m:r>
+                                  <a:rPr lang="en-US" b="0" i="1" smtClean="0">
+                                    <a:latin typeface="Cambria Math" panose="02040503050406030204" pitchFamily="18" charset="0"/>
+                                    <a:ea typeface="Noto Serif" panose="02020502060505020204" pitchFamily="18"/>
+                                    <a:cs typeface="Noto Serif" panose="02020502060505020204" pitchFamily="18"/>
+                                  </a:rPr>
+                                  <m:t>2</m:t>
+                                </m:r>
+                              </m:sub>
+                              <m:sup>
+                                <m:r>
+                                  <a:rPr lang="en-US" b="0" i="1" smtClean="0">
+                                    <a:latin typeface="Cambria Math" panose="02040503050406030204" pitchFamily="18" charset="0"/>
+                                    <a:ea typeface="Noto Serif" panose="02020502060505020204" pitchFamily="18"/>
+                                    <a:cs typeface="Noto Serif" panose="02020502060505020204" pitchFamily="18"/>
+                                  </a:rPr>
+                                  <m:t>𝐴</m:t>
+                                </m:r>
+                              </m:sup>
+                            </m:sSubSup>
+                            <m:r>
+                              <a:rPr lang="en-US" b="0" i="1" smtClean="0">
+                                <a:latin typeface="Cambria Math" panose="02040503050406030204" pitchFamily="18" charset="0"/>
+                                <a:ea typeface="Noto Serif" panose="02020502060505020204" pitchFamily="18"/>
+                                <a:cs typeface="Noto Serif" panose="02020502060505020204" pitchFamily="18"/>
+                              </a:rPr>
+                              <m:t>, </m:t>
+                            </m:r>
+                            <m:sSubSup>
+                              <m:sSubSupPr>
+                                <m:ctrlPr>
+                                  <a:rPr lang="en-US" b="0" i="1" smtClean="0">
+                                    <a:latin typeface="Cambria Math" panose="02040503050406030204" pitchFamily="18" charset="0"/>
+                                    <a:ea typeface="Noto Serif" panose="02020502060505020204" pitchFamily="18"/>
+                                    <a:cs typeface="Noto Serif" panose="02020502060505020204" pitchFamily="18"/>
+                                  </a:rPr>
+                                </m:ctrlPr>
+                              </m:sSubSupPr>
+                              <m:e>
+                                <m:r>
+                                  <a:rPr lang="en-US" b="0" i="1" smtClean="0">
+                                    <a:latin typeface="Cambria Math" panose="02040503050406030204" pitchFamily="18" charset="0"/>
+                                    <a:ea typeface="Noto Serif" panose="02020502060505020204" pitchFamily="18"/>
+                                    <a:cs typeface="Noto Serif" panose="02020502060505020204" pitchFamily="18"/>
+                                  </a:rPr>
+                                  <m:t>𝑥</m:t>
+                                </m:r>
+                              </m:e>
+                              <m:sub>
+                                <m:r>
+                                  <a:rPr lang="en-US" b="0" i="1" smtClean="0">
+                                    <a:latin typeface="Cambria Math" panose="02040503050406030204" pitchFamily="18" charset="0"/>
+                                    <a:ea typeface="Noto Serif" panose="02020502060505020204" pitchFamily="18"/>
+                                    <a:cs typeface="Noto Serif" panose="02020502060505020204" pitchFamily="18"/>
+                                  </a:rPr>
+                                  <m:t>3</m:t>
+                                </m:r>
+                              </m:sub>
+                              <m:sup>
+                                <m:r>
+                                  <a:rPr lang="en-US" b="0" i="1" smtClean="0">
+                                    <a:latin typeface="Cambria Math" panose="02040503050406030204" pitchFamily="18" charset="0"/>
+                                    <a:ea typeface="Noto Serif" panose="02020502060505020204" pitchFamily="18"/>
+                                    <a:cs typeface="Noto Serif" panose="02020502060505020204" pitchFamily="18"/>
+                                  </a:rPr>
+                                  <m:t>𝐴</m:t>
+                                </m:r>
+                              </m:sup>
+                            </m:sSubSup>
+                          </m:e>
+                        </m:d>
+                      </m:oMath>
+                    </m:oMathPara>
+                  </a14:m>
+                  <a:endParaRPr lang="en-US" dirty="0">
+                    <a:latin typeface="Noto Serif" panose="02020502060505020204" pitchFamily="18"/>
+                    <a:ea typeface="Noto Serif" panose="02020502060505020204" pitchFamily="18"/>
+                    <a:cs typeface="Noto Serif" panose="02020502060505020204" pitchFamily="18"/>
+                  </a:endParaRPr>
+                </a:p>
+              </p:txBody>
+            </p:sp>
+          </mc:Choice>
+          <mc:Fallback>
+            <p:sp>
+              <p:nvSpPr>
+                <p:cNvPr id="9" name="TextBox 8">
+                  <a:extLst>
+                    <a:ext uri="{FF2B5EF4-FFF2-40B4-BE49-F238E27FC236}">
+                      <a16:creationId xmlns:a16="http://schemas.microsoft.com/office/drawing/2014/main" id="{912F311E-AFF2-451A-863E-849C0F10C5ED}"/>
+                    </a:ext>
+                  </a:extLst>
+                </p:cNvPr>
+                <p:cNvSpPr txBox="1">
+                  <a:spLocks noRot="1" noChangeAspect="1" noMove="1" noResize="1" noEditPoints="1" noAdjustHandles="1" noChangeArrowheads="1" noChangeShapeType="1" noTextEdit="1"/>
+                </p:cNvSpPr>
+                <p:nvPr/>
+              </p:nvSpPr>
+              <p:spPr>
+                <a:xfrm>
+                  <a:off x="2695048" y="3135659"/>
+                  <a:ext cx="1067856" cy="404983"/>
+                </a:xfrm>
+                <a:prstGeom prst="rect">
+                  <a:avLst/>
+                </a:prstGeom>
+                <a:blipFill>
+                  <a:blip r:embed="rId2"/>
+                  <a:stretch>
+                    <a:fillRect/>
+                  </a:stretch>
+                </a:blipFill>
+              </p:spPr>
+              <p:txBody>
+                <a:bodyPr/>
+                <a:lstStyle/>
+                <a:p>
+                  <a:r>
+                    <a:rPr lang="en-US">
+                      <a:noFill/>
+                    </a:rPr>
+                    <a:t> </a:t>
+                  </a:r>
+                </a:p>
+              </p:txBody>
+            </p:sp>
+          </mc:Fallback>
+        </mc:AlternateContent>
+        <mc:AlternateContent xmlns:mc="http://schemas.openxmlformats.org/markup-compatibility/2006">
+          <mc:Choice xmlns:a14="http://schemas.microsoft.com/office/drawing/2010/main" Requires="a14">
+            <p:sp>
+              <p:nvSpPr>
+                <p:cNvPr id="10" name="TextBox 9">
+                  <a:extLst>
+                    <a:ext uri="{FF2B5EF4-FFF2-40B4-BE49-F238E27FC236}">
+                      <a16:creationId xmlns:a16="http://schemas.microsoft.com/office/drawing/2014/main" id="{72563D3E-854D-466E-9BFC-6A5AF861E726}"/>
+                    </a:ext>
+                  </a:extLst>
+                </p:cNvPr>
+                <p:cNvSpPr txBox="1"/>
+                <p:nvPr/>
+              </p:nvSpPr>
+              <p:spPr>
+                <a:xfrm>
+                  <a:off x="8940963" y="2679530"/>
+                  <a:ext cx="1049966" cy="374590"/>
+                </a:xfrm>
+                <a:prstGeom prst="rect">
+                  <a:avLst/>
+                </a:prstGeom>
+                <a:noFill/>
+              </p:spPr>
+              <p:txBody>
+                <a:bodyPr wrap="none" rtlCol="0">
+                  <a:spAutoFit/>
+                </a:bodyPr>
+                <a:lstStyle/>
+                <a:p>
+                  <a14:m>
+                    <m:oMathPara xmlns:m="http://schemas.openxmlformats.org/officeDocument/2006/math">
+                      <m:oMathParaPr>
+                        <m:jc m:val="centerGroup"/>
+                      </m:oMathParaPr>
+                      <m:oMath xmlns:m="http://schemas.openxmlformats.org/officeDocument/2006/math">
+                        <m:d>
+                          <m:dPr>
+                            <m:ctrlPr>
+                              <a:rPr lang="en-US" b="0" i="1" smtClean="0">
+                                <a:latin typeface="Cambria Math" panose="02040503050406030204" pitchFamily="18" charset="0"/>
+                                <a:ea typeface="Noto Serif" panose="02020502060505020204" pitchFamily="18"/>
+                                <a:cs typeface="Noto Serif" panose="02020502060505020204" pitchFamily="18"/>
+                              </a:rPr>
+                            </m:ctrlPr>
+                          </m:dPr>
+                          <m:e>
+                            <m:sSubSup>
+                              <m:sSubSupPr>
+                                <m:ctrlPr>
+                                  <a:rPr lang="en-US" b="0" i="1" smtClean="0">
+                                    <a:latin typeface="Cambria Math" panose="02040503050406030204" pitchFamily="18" charset="0"/>
+                                    <a:ea typeface="Noto Serif" panose="02020502060505020204" pitchFamily="18"/>
+                                    <a:cs typeface="Noto Serif" panose="02020502060505020204" pitchFamily="18"/>
+                                  </a:rPr>
+                                </m:ctrlPr>
+                              </m:sSubSupPr>
+                              <m:e>
+                                <m:r>
+                                  <a:rPr lang="en-US" b="0" i="1" smtClean="0">
+                                    <a:latin typeface="Cambria Math" panose="02040503050406030204" pitchFamily="18" charset="0"/>
+                                    <a:ea typeface="Noto Serif" panose="02020502060505020204" pitchFamily="18"/>
+                                    <a:cs typeface="Noto Serif" panose="02020502060505020204" pitchFamily="18"/>
+                                  </a:rPr>
+                                  <m:t>𝑥</m:t>
+                                </m:r>
+                              </m:e>
+                              <m:sub>
+                                <m:r>
+                                  <a:rPr lang="en-US" b="0" i="1" smtClean="0">
+                                    <a:latin typeface="Cambria Math" panose="02040503050406030204" pitchFamily="18" charset="0"/>
+                                    <a:ea typeface="Noto Serif" panose="02020502060505020204" pitchFamily="18"/>
+                                    <a:cs typeface="Noto Serif" panose="02020502060505020204" pitchFamily="18"/>
+                                  </a:rPr>
+                                  <m:t>2</m:t>
+                                </m:r>
+                              </m:sub>
+                              <m:sup>
+                                <m:r>
+                                  <a:rPr lang="en-US" b="0" i="1" smtClean="0">
+                                    <a:latin typeface="Cambria Math" panose="02040503050406030204" pitchFamily="18" charset="0"/>
+                                    <a:ea typeface="Noto Serif" panose="02020502060505020204" pitchFamily="18"/>
+                                    <a:cs typeface="Noto Serif" panose="02020502060505020204" pitchFamily="18"/>
+                                  </a:rPr>
+                                  <m:t>𝐵</m:t>
+                                </m:r>
+                              </m:sup>
+                            </m:sSubSup>
+                            <m:r>
+                              <a:rPr lang="en-US" b="0" i="1" smtClean="0">
+                                <a:latin typeface="Cambria Math" panose="02040503050406030204" pitchFamily="18" charset="0"/>
+                                <a:ea typeface="Noto Serif" panose="02020502060505020204" pitchFamily="18"/>
+                                <a:cs typeface="Noto Serif" panose="02020502060505020204" pitchFamily="18"/>
+                              </a:rPr>
+                              <m:t>, </m:t>
+                            </m:r>
+                            <m:sSubSup>
+                              <m:sSubSupPr>
+                                <m:ctrlPr>
+                                  <a:rPr lang="en-US" b="0" i="1" smtClean="0">
+                                    <a:latin typeface="Cambria Math" panose="02040503050406030204" pitchFamily="18" charset="0"/>
+                                    <a:ea typeface="Noto Serif" panose="02020502060505020204" pitchFamily="18"/>
+                                    <a:cs typeface="Noto Serif" panose="02020502060505020204" pitchFamily="18"/>
+                                  </a:rPr>
+                                </m:ctrlPr>
+                              </m:sSubSupPr>
+                              <m:e>
+                                <m:r>
+                                  <a:rPr lang="en-US" b="0" i="1" smtClean="0">
+                                    <a:latin typeface="Cambria Math" panose="02040503050406030204" pitchFamily="18" charset="0"/>
+                                    <a:ea typeface="Noto Serif" panose="02020502060505020204" pitchFamily="18"/>
+                                    <a:cs typeface="Noto Serif" panose="02020502060505020204" pitchFamily="18"/>
+                                  </a:rPr>
+                                  <m:t>𝑥</m:t>
+                                </m:r>
+                              </m:e>
+                              <m:sub>
+                                <m:r>
+                                  <a:rPr lang="en-US" b="0" i="1" smtClean="0">
+                                    <a:latin typeface="Cambria Math" panose="02040503050406030204" pitchFamily="18" charset="0"/>
+                                    <a:ea typeface="Noto Serif" panose="02020502060505020204" pitchFamily="18"/>
+                                    <a:cs typeface="Noto Serif" panose="02020502060505020204" pitchFamily="18"/>
+                                  </a:rPr>
+                                  <m:t>3</m:t>
+                                </m:r>
+                              </m:sub>
+                              <m:sup>
+                                <m:r>
+                                  <a:rPr lang="en-US" b="0" i="1" smtClean="0">
+                                    <a:latin typeface="Cambria Math" panose="02040503050406030204" pitchFamily="18" charset="0"/>
+                                    <a:ea typeface="Noto Serif" panose="02020502060505020204" pitchFamily="18"/>
+                                    <a:cs typeface="Noto Serif" panose="02020502060505020204" pitchFamily="18"/>
+                                  </a:rPr>
+                                  <m:t>𝐵</m:t>
+                                </m:r>
+                              </m:sup>
+                            </m:sSubSup>
+                          </m:e>
+                        </m:d>
+                      </m:oMath>
+                    </m:oMathPara>
+                  </a14:m>
+                  <a:endParaRPr lang="en-US" dirty="0">
+                    <a:latin typeface="Noto Serif" panose="02020502060505020204" pitchFamily="18"/>
+                    <a:ea typeface="Noto Serif" panose="02020502060505020204" pitchFamily="18"/>
+                    <a:cs typeface="Noto Serif" panose="02020502060505020204" pitchFamily="18"/>
+                  </a:endParaRPr>
+                </a:p>
+              </p:txBody>
+            </p:sp>
+          </mc:Choice>
+          <mc:Fallback>
+            <p:sp>
+              <p:nvSpPr>
+                <p:cNvPr id="10" name="TextBox 9">
+                  <a:extLst>
+                    <a:ext uri="{FF2B5EF4-FFF2-40B4-BE49-F238E27FC236}">
+                      <a16:creationId xmlns:a16="http://schemas.microsoft.com/office/drawing/2014/main" id="{72563D3E-854D-466E-9BFC-6A5AF861E726}"/>
+                    </a:ext>
+                  </a:extLst>
+                </p:cNvPr>
+                <p:cNvSpPr txBox="1">
+                  <a:spLocks noRot="1" noChangeAspect="1" noMove="1" noResize="1" noEditPoints="1" noAdjustHandles="1" noChangeArrowheads="1" noChangeShapeType="1" noTextEdit="1"/>
+                </p:cNvSpPr>
+                <p:nvPr/>
+              </p:nvSpPr>
+              <p:spPr>
+                <a:xfrm>
+                  <a:off x="8940963" y="2679530"/>
+                  <a:ext cx="1049966" cy="374590"/>
+                </a:xfrm>
+                <a:prstGeom prst="rect">
+                  <a:avLst/>
+                </a:prstGeom>
+                <a:blipFill>
+                  <a:blip r:embed="rId3"/>
+                  <a:stretch>
+                    <a:fillRect b="-1639"/>
+                  </a:stretch>
+                </a:blipFill>
+              </p:spPr>
+              <p:txBody>
+                <a:bodyPr/>
+                <a:lstStyle/>
+                <a:p>
+                  <a:r>
+                    <a:rPr lang="en-US">
+                      <a:noFill/>
+                    </a:rPr>
+                    <a:t> </a:t>
+                  </a:r>
+                </a:p>
+              </p:txBody>
+            </p:sp>
+          </mc:Fallback>
+        </mc:AlternateContent>
+        <p:sp>
+          <p:nvSpPr>
+            <p:cNvPr id="11" name="TextBox 10">
+              <a:extLst>
+                <a:ext uri="{FF2B5EF4-FFF2-40B4-BE49-F238E27FC236}">
+                  <a16:creationId xmlns:a16="http://schemas.microsoft.com/office/drawing/2014/main" id="{5D9D4CE6-4EE1-48BB-95B0-0683761515B1}"/>
+                </a:ext>
+              </a:extLst>
+            </p:cNvPr>
+            <p:cNvSpPr txBox="1"/>
+            <p:nvPr/>
+          </p:nvSpPr>
+          <p:spPr>
+            <a:xfrm>
+              <a:off x="3054890" y="2794902"/>
+              <a:ext cx="348172" cy="369332"/>
+            </a:xfrm>
+            <a:prstGeom prst="rect">
+              <a:avLst/>
+            </a:prstGeom>
+            <a:noFill/>
+          </p:spPr>
+          <p:txBody>
+            <a:bodyPr wrap="none" rtlCol="0">
+              <a:spAutoFit/>
+            </a:bodyPr>
+            <a:lstStyle/>
+            <a:p>
+              <a:r>
+                <a:rPr lang="en-US" dirty="0">
+                  <a:latin typeface="Noto Serif" panose="02020502060505020204" pitchFamily="18"/>
+                  <a:ea typeface="Noto Serif" panose="02020502060505020204" pitchFamily="18"/>
+                  <a:cs typeface="Noto Serif" panose="02020502060505020204" pitchFamily="18"/>
+                </a:rPr>
+                <a:t>A</a:t>
+              </a:r>
+            </a:p>
+          </p:txBody>
+        </p:sp>
+        <p:sp>
+          <p:nvSpPr>
+            <p:cNvPr id="12" name="TextBox 11">
+              <a:extLst>
+                <a:ext uri="{FF2B5EF4-FFF2-40B4-BE49-F238E27FC236}">
+                  <a16:creationId xmlns:a16="http://schemas.microsoft.com/office/drawing/2014/main" id="{CC330BC3-D341-4C41-9CF1-5741FB49B56D}"/>
+                </a:ext>
+              </a:extLst>
+            </p:cNvPr>
+            <p:cNvSpPr txBox="1"/>
+            <p:nvPr/>
+          </p:nvSpPr>
+          <p:spPr>
+            <a:xfrm>
+              <a:off x="9142096" y="2310198"/>
+              <a:ext cx="335348" cy="369332"/>
+            </a:xfrm>
+            <a:prstGeom prst="rect">
+              <a:avLst/>
+            </a:prstGeom>
+            <a:noFill/>
+          </p:spPr>
+          <p:txBody>
+            <a:bodyPr wrap="none" rtlCol="0">
+              <a:spAutoFit/>
+            </a:bodyPr>
+            <a:lstStyle/>
+            <a:p>
+              <a:r>
+                <a:rPr lang="en-US" dirty="0">
+                  <a:latin typeface="Noto Serif" panose="02020502060505020204" pitchFamily="18"/>
+                  <a:ea typeface="Noto Serif" panose="02020502060505020204" pitchFamily="18"/>
+                  <a:cs typeface="Noto Serif" panose="02020502060505020204" pitchFamily="18"/>
+                </a:rPr>
+                <a:t>B</a:t>
+              </a:r>
+            </a:p>
+          </p:txBody>
+        </p:sp>
+        <p:sp>
+          <p:nvSpPr>
+            <p:cNvPr id="13" name="Oval 12">
+              <a:extLst>
+                <a:ext uri="{FF2B5EF4-FFF2-40B4-BE49-F238E27FC236}">
+                  <a16:creationId xmlns:a16="http://schemas.microsoft.com/office/drawing/2014/main" id="{64AE30C2-AFB3-4DF5-AE55-75FD6624069A}"/>
+                </a:ext>
+              </a:extLst>
+            </p:cNvPr>
+            <p:cNvSpPr>
+              <a:spLocks noChangeAspect="1"/>
+            </p:cNvSpPr>
+            <p:nvPr/>
+          </p:nvSpPr>
+          <p:spPr>
+            <a:xfrm>
+              <a:off x="7145656" y="3229130"/>
+              <a:ext cx="91440" cy="91440"/>
+            </a:xfrm>
+            <a:prstGeom prst="ellipse">
+              <a:avLst/>
+            </a:prstGeom>
+            <a:solidFill>
+              <a:schemeClr val="accent1"/>
+            </a:solidFill>
+            <a:ln>
+              <a:noFill/>
+            </a:ln>
+          </p:spPr>
+          <p:style>
+            <a:lnRef idx="0">
+              <a:scrgbClr r="0" g="0" b="0"/>
+            </a:lnRef>
+            <a:fillRef idx="0">
+              <a:scrgbClr r="0" g="0" b="0"/>
+            </a:fillRef>
+            <a:effectRef idx="0">
+              <a:scrgbClr r="0" g="0" b="0"/>
+            </a:effectRef>
+            <a:fontRef idx="minor">
+              <a:schemeClr val="lt1"/>
+            </a:fontRef>
+          </p:style>
+          <p:txBody>
+            <a:bodyPr rtlCol="0" anchor="ctr"/>
+            <a:lstStyle/>
+            <a:p>
+              <a:pPr algn="ctr"/>
+              <a:endParaRPr lang="en-US"/>
+            </a:p>
+          </p:txBody>
+        </p:sp>
+        <p:sp>
+          <p:nvSpPr>
+            <p:cNvPr id="14" name="TextBox 13">
+              <a:extLst>
+                <a:ext uri="{FF2B5EF4-FFF2-40B4-BE49-F238E27FC236}">
+                  <a16:creationId xmlns:a16="http://schemas.microsoft.com/office/drawing/2014/main" id="{C05861F8-7F04-4A3A-A0DB-B704EBA0C65E}"/>
+                </a:ext>
+              </a:extLst>
+            </p:cNvPr>
+            <p:cNvSpPr txBox="1"/>
+            <p:nvPr/>
+          </p:nvSpPr>
+          <p:spPr>
+            <a:xfrm>
+              <a:off x="7036560" y="2831186"/>
+              <a:ext cx="401072" cy="369332"/>
+            </a:xfrm>
+            <a:prstGeom prst="rect">
+              <a:avLst/>
+            </a:prstGeom>
+            <a:noFill/>
+          </p:spPr>
+          <p:txBody>
+            <a:bodyPr wrap="none" rtlCol="0">
+              <a:spAutoFit/>
+            </a:bodyPr>
+            <a:lstStyle/>
+            <a:p>
+              <a:r>
+                <a:rPr lang="en-US" dirty="0">
+                  <a:latin typeface="Noto Serif" panose="02020502060505020204" pitchFamily="18"/>
+                  <a:ea typeface="Noto Serif" panose="02020502060505020204" pitchFamily="18"/>
+                  <a:cs typeface="Noto Serif" panose="02020502060505020204" pitchFamily="18"/>
+                </a:rPr>
+                <a:t>M</a:t>
+              </a:r>
+            </a:p>
+          </p:txBody>
+        </p:sp>
+        <mc:AlternateContent xmlns:mc="http://schemas.openxmlformats.org/markup-compatibility/2006">
+          <mc:Choice xmlns:a14="http://schemas.microsoft.com/office/drawing/2010/main" Requires="a14">
+            <p:sp>
+              <p:nvSpPr>
+                <p:cNvPr id="16" name="TextBox 15">
+                  <a:extLst>
+                    <a:ext uri="{FF2B5EF4-FFF2-40B4-BE49-F238E27FC236}">
+                      <a16:creationId xmlns:a16="http://schemas.microsoft.com/office/drawing/2014/main" id="{2CCA28C8-9524-4016-94F7-7C84D2CBF7D7}"/>
+                    </a:ext>
+                  </a:extLst>
+                </p:cNvPr>
+                <p:cNvSpPr txBox="1"/>
+                <p:nvPr/>
+              </p:nvSpPr>
+              <p:spPr>
+                <a:xfrm>
+                  <a:off x="5527089" y="3844350"/>
+                  <a:ext cx="358199" cy="646331"/>
+                </a:xfrm>
+                <a:prstGeom prst="rect">
+                  <a:avLst/>
+                </a:prstGeom>
+                <a:noFill/>
+              </p:spPr>
+              <p:txBody>
+                <a:bodyPr wrap="square" rtlCol="0">
+                  <a:spAutoFit/>
+                </a:bodyPr>
+                <a:lstStyle/>
+                <a:p>
+                  <a:endParaRPr lang="en-US" b="0" i="1" dirty="0">
+                    <a:latin typeface="Cambria Math" panose="02040503050406030204" pitchFamily="18" charset="0"/>
+                    <a:ea typeface="Noto Serif" panose="02020502060505020204" pitchFamily="18"/>
+                    <a:cs typeface="Noto Serif" panose="02020502060505020204" pitchFamily="18"/>
+                  </a:endParaRPr>
+                </a:p>
+                <a:p>
+                  <a14:m>
+                    <m:oMathPara xmlns:m="http://schemas.openxmlformats.org/officeDocument/2006/math">
+                      <m:oMathParaPr>
+                        <m:jc m:val="centerGroup"/>
+                      </m:oMathParaPr>
+                      <m:oMath xmlns:m="http://schemas.openxmlformats.org/officeDocument/2006/math">
+                        <m:sSub>
+                          <m:sSubPr>
+                            <m:ctrlPr>
+                              <a:rPr lang="en-US" b="0" i="1" smtClean="0">
+                                <a:latin typeface="Cambria Math" panose="02040503050406030204" pitchFamily="18" charset="0"/>
+                                <a:ea typeface="Noto Serif" panose="02020502060505020204" pitchFamily="18"/>
+                                <a:cs typeface="Noto Serif" panose="02020502060505020204" pitchFamily="18"/>
+                              </a:rPr>
+                            </m:ctrlPr>
+                          </m:sSubPr>
+                          <m:e>
+                            <m:r>
+                              <a:rPr lang="en-US" b="0" i="1" smtClean="0">
+                                <a:latin typeface="Cambria Math" panose="02040503050406030204" pitchFamily="18" charset="0"/>
+                                <a:ea typeface="Noto Serif" panose="02020502060505020204" pitchFamily="18"/>
+                                <a:cs typeface="Noto Serif" panose="02020502060505020204" pitchFamily="18"/>
+                              </a:rPr>
+                              <m:t>𝑥</m:t>
+                            </m:r>
+                          </m:e>
+                          <m:sub>
+                            <m:r>
+                              <a:rPr lang="en-US" b="0" i="1" smtClean="0">
+                                <a:latin typeface="Cambria Math" panose="02040503050406030204" pitchFamily="18" charset="0"/>
+                                <a:ea typeface="Noto Serif" panose="02020502060505020204" pitchFamily="18"/>
+                                <a:cs typeface="Noto Serif" panose="02020502060505020204" pitchFamily="18"/>
+                              </a:rPr>
+                              <m:t>2</m:t>
+                            </m:r>
+                          </m:sub>
+                        </m:sSub>
+                      </m:oMath>
+                    </m:oMathPara>
+                  </a14:m>
+                  <a:endParaRPr lang="en-US" dirty="0">
+                    <a:latin typeface="Noto Serif" panose="02020502060505020204" pitchFamily="18"/>
+                    <a:ea typeface="Noto Serif" panose="02020502060505020204" pitchFamily="18"/>
+                    <a:cs typeface="Noto Serif" panose="02020502060505020204" pitchFamily="18"/>
+                  </a:endParaRPr>
+                </a:p>
+              </p:txBody>
+            </p:sp>
+          </mc:Choice>
+          <mc:Fallback>
+            <p:sp>
+              <p:nvSpPr>
+                <p:cNvPr id="16" name="TextBox 15">
+                  <a:extLst>
+                    <a:ext uri="{FF2B5EF4-FFF2-40B4-BE49-F238E27FC236}">
+                      <a16:creationId xmlns:a16="http://schemas.microsoft.com/office/drawing/2014/main" id="{2CCA28C8-9524-4016-94F7-7C84D2CBF7D7}"/>
+                    </a:ext>
+                  </a:extLst>
+                </p:cNvPr>
+                <p:cNvSpPr txBox="1">
+                  <a:spLocks noRot="1" noChangeAspect="1" noMove="1" noResize="1" noEditPoints="1" noAdjustHandles="1" noChangeArrowheads="1" noChangeShapeType="1" noTextEdit="1"/>
+                </p:cNvSpPr>
+                <p:nvPr/>
+              </p:nvSpPr>
+              <p:spPr>
+                <a:xfrm>
+                  <a:off x="5527089" y="3844350"/>
+                  <a:ext cx="358199" cy="646331"/>
+                </a:xfrm>
+                <a:prstGeom prst="rect">
+                  <a:avLst/>
+                </a:prstGeom>
+                <a:blipFill>
+                  <a:blip r:embed="rId4"/>
+                  <a:stretch>
+                    <a:fillRect r="-3448"/>
+                  </a:stretch>
+                </a:blipFill>
+              </p:spPr>
+              <p:txBody>
+                <a:bodyPr/>
+                <a:lstStyle/>
+                <a:p>
+                  <a:r>
+                    <a:rPr lang="en-US">
+                      <a:noFill/>
+                    </a:rPr>
+                    <a:t> </a:t>
+                  </a:r>
+                </a:p>
+              </p:txBody>
+            </p:sp>
+          </mc:Fallback>
+        </mc:AlternateContent>
+        <mc:AlternateContent xmlns:mc="http://schemas.openxmlformats.org/markup-compatibility/2006">
+          <mc:Choice xmlns:a14="http://schemas.microsoft.com/office/drawing/2010/main" Requires="a14">
+            <p:sp>
+              <p:nvSpPr>
+                <p:cNvPr id="17" name="TextBox 16">
+                  <a:extLst>
+                    <a:ext uri="{FF2B5EF4-FFF2-40B4-BE49-F238E27FC236}">
+                      <a16:creationId xmlns:a16="http://schemas.microsoft.com/office/drawing/2014/main" id="{8534759F-18D7-4E84-9691-B0EB815DDEF6}"/>
+                    </a:ext>
+                  </a:extLst>
+                </p:cNvPr>
+                <p:cNvSpPr txBox="1"/>
+                <p:nvPr/>
+              </p:nvSpPr>
+              <p:spPr>
+                <a:xfrm>
+                  <a:off x="4533459" y="3110866"/>
+                  <a:ext cx="650434" cy="369332"/>
+                </a:xfrm>
+                <a:prstGeom prst="rect">
+                  <a:avLst/>
+                </a:prstGeom>
+                <a:noFill/>
+              </p:spPr>
+              <p:txBody>
+                <a:bodyPr wrap="none" rtlCol="0">
+                  <a:spAutoFit/>
+                </a:bodyPr>
+                <a:lstStyle/>
+                <a:p>
+                  <a14:m>
+                    <m:oMath xmlns:m="http://schemas.openxmlformats.org/officeDocument/2006/math">
+                      <m:sSub>
+                        <m:sSubPr>
+                          <m:ctrlPr>
+                            <a:rPr lang="en-US" b="0" i="1" smtClean="0">
+                              <a:latin typeface="Cambria Math" panose="02040503050406030204" pitchFamily="18" charset="0"/>
+                              <a:ea typeface="Noto Serif" panose="02020502060505020204" pitchFamily="18"/>
+                              <a:cs typeface="Noto Serif" panose="02020502060505020204" pitchFamily="18"/>
+                            </a:rPr>
+                          </m:ctrlPr>
+                        </m:sSubPr>
+                        <m:e>
+                          <m:r>
+                            <a:rPr lang="en-US" b="0" i="1" smtClean="0">
+                              <a:latin typeface="Cambria Math" panose="02040503050406030204" pitchFamily="18" charset="0"/>
+                              <a:ea typeface="Noto Serif" panose="02020502060505020204" pitchFamily="18"/>
+                              <a:cs typeface="Noto Serif" panose="02020502060505020204" pitchFamily="18"/>
+                            </a:rPr>
+                            <m:t>𝑥</m:t>
+                          </m:r>
+                        </m:e>
+                        <m:sub>
+                          <m:r>
+                            <a:rPr lang="en-US" b="0" i="1" smtClean="0">
+                              <a:latin typeface="Cambria Math" panose="02040503050406030204" pitchFamily="18" charset="0"/>
+                              <a:ea typeface="Noto Serif" panose="02020502060505020204" pitchFamily="18"/>
+                              <a:cs typeface="Noto Serif" panose="02020502060505020204" pitchFamily="18"/>
+                            </a:rPr>
+                            <m:t>3</m:t>
+                          </m:r>
+                        </m:sub>
+                      </m:sSub>
+                    </m:oMath>
+                  </a14:m>
+                  <a:r>
+                    <a:rPr lang="en-US" dirty="0">
+                      <a:latin typeface="Noto Serif" panose="02020502060505020204" pitchFamily="18"/>
+                      <a:ea typeface="Noto Serif" panose="02020502060505020204" pitchFamily="18"/>
+                      <a:cs typeface="Noto Serif" panose="02020502060505020204" pitchFamily="18"/>
+                    </a:rPr>
+                    <a:t>    </a:t>
+                  </a:r>
+                </a:p>
+              </p:txBody>
+            </p:sp>
+          </mc:Choice>
+          <mc:Fallback>
+            <p:sp>
+              <p:nvSpPr>
+                <p:cNvPr id="17" name="TextBox 16">
+                  <a:extLst>
+                    <a:ext uri="{FF2B5EF4-FFF2-40B4-BE49-F238E27FC236}">
+                      <a16:creationId xmlns:a16="http://schemas.microsoft.com/office/drawing/2014/main" id="{8534759F-18D7-4E84-9691-B0EB815DDEF6}"/>
+                    </a:ext>
+                  </a:extLst>
+                </p:cNvPr>
+                <p:cNvSpPr txBox="1">
+                  <a:spLocks noRot="1" noChangeAspect="1" noMove="1" noResize="1" noEditPoints="1" noAdjustHandles="1" noChangeArrowheads="1" noChangeShapeType="1" noTextEdit="1"/>
+                </p:cNvSpPr>
+                <p:nvPr/>
+              </p:nvSpPr>
+              <p:spPr>
+                <a:xfrm>
+                  <a:off x="4533459" y="3110866"/>
+                  <a:ext cx="650434" cy="369332"/>
+                </a:xfrm>
+                <a:prstGeom prst="rect">
+                  <a:avLst/>
+                </a:prstGeom>
+                <a:blipFill>
+                  <a:blip r:embed="rId5"/>
+                  <a:stretch>
+                    <a:fillRect/>
+                  </a:stretch>
+                </a:blipFill>
+              </p:spPr>
+              <p:txBody>
+                <a:bodyPr/>
+                <a:lstStyle/>
+                <a:p>
+                  <a:r>
+                    <a:rPr lang="en-US">
+                      <a:noFill/>
+                    </a:rPr>
+                    <a:t> </a:t>
+                  </a:r>
+                </a:p>
+              </p:txBody>
+            </p:sp>
+          </mc:Fallback>
+        </mc:AlternateContent>
+        <p:cxnSp>
+          <p:nvCxnSpPr>
+            <p:cNvPr id="4" name="Connector: Elbow 3">
+              <a:extLst>
+                <a:ext uri="{FF2B5EF4-FFF2-40B4-BE49-F238E27FC236}">
+                  <a16:creationId xmlns:a16="http://schemas.microsoft.com/office/drawing/2014/main" id="{1828122E-4913-4C6A-A938-20273FC8EC4F}"/>
+                </a:ext>
+              </a:extLst>
+            </p:cNvPr>
+            <p:cNvCxnSpPr>
+              <a:cxnSpLocks/>
+              <a:stCxn id="17" idx="2"/>
+              <a:endCxn id="16" idx="1"/>
+            </p:cNvCxnSpPr>
+            <p:nvPr/>
+          </p:nvCxnSpPr>
+          <p:spPr>
+            <a:xfrm rot="16200000" flipH="1">
+              <a:off x="4849223" y="3489650"/>
+              <a:ext cx="687318" cy="668413"/>
+            </a:xfrm>
+            <a:prstGeom prst="bentConnector2">
+              <a:avLst/>
+            </a:prstGeom>
+            <a:ln>
+              <a:headEnd type="triangle"/>
+              <a:tailEnd type="triangle"/>
+            </a:ln>
+          </p:spPr>
+          <p:style>
+            <a:lnRef idx="1">
+              <a:schemeClr val="dk1"/>
+            </a:lnRef>
+            <a:fillRef idx="0">
+              <a:schemeClr val="dk1"/>
+            </a:fillRef>
+            <a:effectRef idx="0">
+              <a:schemeClr val="dk1"/>
+            </a:effectRef>
+            <a:fontRef idx="minor">
+              <a:schemeClr val="tx1"/>
+            </a:fontRef>
+          </p:style>
+        </p:cxnSp>
+        <p:sp>
+          <p:nvSpPr>
+            <p:cNvPr id="20" name="Oval 19">
+              <a:extLst>
+                <a:ext uri="{FF2B5EF4-FFF2-40B4-BE49-F238E27FC236}">
+                  <a16:creationId xmlns:a16="http://schemas.microsoft.com/office/drawing/2014/main" id="{CE1C14DF-7EC6-4A4B-AB4F-2018CD92E665}"/>
+                </a:ext>
+              </a:extLst>
+            </p:cNvPr>
+            <p:cNvSpPr>
+              <a:spLocks noChangeAspect="1"/>
+            </p:cNvSpPr>
+            <p:nvPr/>
+          </p:nvSpPr>
+          <p:spPr>
+            <a:xfrm>
+              <a:off x="4812955" y="4121797"/>
+              <a:ext cx="91440" cy="91440"/>
+            </a:xfrm>
+            <a:prstGeom prst="ellipse">
+              <a:avLst/>
+            </a:prstGeom>
+            <a:solidFill>
+              <a:schemeClr val="dk1"/>
+            </a:solidFill>
+            <a:ln>
+              <a:noFill/>
+            </a:ln>
+          </p:spPr>
+          <p:style>
+            <a:lnRef idx="0">
+              <a:scrgbClr r="0" g="0" b="0"/>
+            </a:lnRef>
+            <a:fillRef idx="0">
+              <a:scrgbClr r="0" g="0" b="0"/>
+            </a:fillRef>
+            <a:effectRef idx="0">
+              <a:scrgbClr r="0" g="0" b="0"/>
+            </a:effectRef>
+            <a:fontRef idx="minor">
+              <a:schemeClr val="lt1"/>
+            </a:fontRef>
+          </p:style>
+          <p:txBody>
+            <a:bodyPr rtlCol="0" anchor="ctr"/>
+            <a:lstStyle/>
+            <a:p>
+              <a:pPr algn="ctr"/>
+              <a:endParaRPr lang="en-US"/>
+            </a:p>
+          </p:txBody>
+        </p:sp>
+        <p:cxnSp>
+          <p:nvCxnSpPr>
+            <p:cNvPr id="22" name="Straight Connector 21">
+              <a:extLst>
+                <a:ext uri="{FF2B5EF4-FFF2-40B4-BE49-F238E27FC236}">
+                  <a16:creationId xmlns:a16="http://schemas.microsoft.com/office/drawing/2014/main" id="{797E476A-A8BE-4124-B74B-83D421DE0066}"/>
+                </a:ext>
+              </a:extLst>
+            </p:cNvPr>
+            <p:cNvCxnSpPr>
+              <a:cxnSpLocks/>
+            </p:cNvCxnSpPr>
+            <p:nvPr/>
+          </p:nvCxnSpPr>
+          <p:spPr>
+            <a:xfrm flipH="1">
+              <a:off x="4858675" y="3273936"/>
+              <a:ext cx="2283804" cy="0"/>
+            </a:xfrm>
+            <a:prstGeom prst="line">
+              <a:avLst/>
+            </a:prstGeom>
+            <a:ln w="9525" cap="flat" cmpd="sng" algn="ctr">
+              <a:solidFill>
+                <a:schemeClr val="dk1"/>
+              </a:solidFill>
+              <a:prstDash val="solid"/>
+              <a:round/>
+              <a:headEnd type="arrow" w="med" len="med"/>
+              <a:tailEnd type="arrow" w="med" len="med"/>
+            </a:ln>
+          </p:spPr>
+          <p:style>
+            <a:lnRef idx="0">
+              <a:scrgbClr r="0" g="0" b="0"/>
+            </a:lnRef>
+            <a:fillRef idx="0">
+              <a:scrgbClr r="0" g="0" b="0"/>
+            </a:fillRef>
+            <a:effectRef idx="0">
+              <a:scrgbClr r="0" g="0" b="0"/>
+            </a:effectRef>
+            <a:fontRef idx="minor">
+              <a:schemeClr val="tx1"/>
+            </a:fontRef>
+          </p:style>
+        </p:cxnSp>
+        <p:cxnSp>
+          <p:nvCxnSpPr>
+            <p:cNvPr id="26" name="Straight Connector 25">
+              <a:extLst>
+                <a:ext uri="{FF2B5EF4-FFF2-40B4-BE49-F238E27FC236}">
+                  <a16:creationId xmlns:a16="http://schemas.microsoft.com/office/drawing/2014/main" id="{CCEAF72B-558A-4EE1-A6D3-4052C4C5DC08}"/>
+                </a:ext>
+              </a:extLst>
+            </p:cNvPr>
+            <p:cNvCxnSpPr>
+              <a:cxnSpLocks/>
+            </p:cNvCxnSpPr>
+            <p:nvPr/>
+          </p:nvCxnSpPr>
+          <p:spPr>
+            <a:xfrm>
+              <a:off x="4858675" y="2663190"/>
+              <a:ext cx="0" cy="1382546"/>
+            </a:xfrm>
+            <a:prstGeom prst="line">
+              <a:avLst/>
+            </a:prstGeom>
+            <a:ln w="9525" cap="flat" cmpd="sng" algn="ctr">
+              <a:solidFill>
+                <a:schemeClr val="dk1"/>
+              </a:solidFill>
+              <a:prstDash val="dash"/>
+              <a:round/>
+              <a:headEnd type="none" w="med" len="med"/>
+              <a:tailEnd type="none" w="med" len="med"/>
+            </a:ln>
+          </p:spPr>
+          <p:style>
+            <a:lnRef idx="0">
+              <a:scrgbClr r="0" g="0" b="0"/>
+            </a:lnRef>
+            <a:fillRef idx="0">
+              <a:scrgbClr r="0" g="0" b="0"/>
+            </a:fillRef>
+            <a:effectRef idx="0">
+              <a:scrgbClr r="0" g="0" b="0"/>
+            </a:effectRef>
+            <a:fontRef idx="minor">
+              <a:schemeClr val="tx1"/>
+            </a:fontRef>
+          </p:style>
+        </p:cxnSp>
+        <mc:AlternateContent xmlns:mc="http://schemas.openxmlformats.org/markup-compatibility/2006">
+          <mc:Choice xmlns:a14="http://schemas.microsoft.com/office/drawing/2010/main" Requires="a14">
+            <p:sp>
+              <p:nvSpPr>
+                <p:cNvPr id="31" name="TextBox 30">
+                  <a:extLst>
+                    <a:ext uri="{FF2B5EF4-FFF2-40B4-BE49-F238E27FC236}">
+                      <a16:creationId xmlns:a16="http://schemas.microsoft.com/office/drawing/2014/main" id="{C56D45B1-50B2-41EE-B21A-885CB116E81D}"/>
+                    </a:ext>
+                  </a:extLst>
+                </p:cNvPr>
+                <p:cNvSpPr txBox="1"/>
+                <p:nvPr/>
+              </p:nvSpPr>
+              <p:spPr>
+                <a:xfrm>
+                  <a:off x="5804986" y="2900757"/>
+                  <a:ext cx="358199" cy="373179"/>
+                </a:xfrm>
+                <a:prstGeom prst="rect">
+                  <a:avLst/>
+                </a:prstGeom>
+                <a:noFill/>
+              </p:spPr>
+              <p:txBody>
+                <a:bodyPr wrap="square" rtlCol="0">
+                  <a:spAutoFit/>
+                </a:bodyPr>
+                <a:lstStyle/>
+                <a:p>
+                  <a14:m>
+                    <m:oMathPara xmlns:m="http://schemas.openxmlformats.org/officeDocument/2006/math">
+                      <m:oMathParaPr>
+                        <m:jc m:val="centerGroup"/>
+                      </m:oMathParaPr>
+                      <m:oMath xmlns:m="http://schemas.openxmlformats.org/officeDocument/2006/math">
+                        <m:sSubSup>
+                          <m:sSubSupPr>
+                            <m:ctrlPr>
+                              <a:rPr lang="en-US" b="0" i="1" smtClean="0">
+                                <a:latin typeface="Cambria Math" panose="02040503050406030204" pitchFamily="18" charset="0"/>
+                                <a:ea typeface="Noto Serif" panose="02020502060505020204" pitchFamily="18"/>
+                                <a:cs typeface="Noto Serif" panose="02020502060505020204" pitchFamily="18"/>
+                              </a:rPr>
+                            </m:ctrlPr>
+                          </m:sSubSupPr>
+                          <m:e>
+                            <m:r>
+                              <a:rPr lang="en-US" b="0" i="1" smtClean="0">
+                                <a:latin typeface="Cambria Math" panose="02040503050406030204" pitchFamily="18" charset="0"/>
+                                <a:ea typeface="Noto Serif" panose="02020502060505020204" pitchFamily="18"/>
+                                <a:cs typeface="Noto Serif" panose="02020502060505020204" pitchFamily="18"/>
+                              </a:rPr>
+                              <m:t>𝑥</m:t>
+                            </m:r>
+                          </m:e>
+                          <m:sub>
+                            <m:r>
+                              <a:rPr lang="en-US" b="0" i="1" smtClean="0">
+                                <a:latin typeface="Cambria Math" panose="02040503050406030204" pitchFamily="18" charset="0"/>
+                                <a:ea typeface="Noto Serif" panose="02020502060505020204" pitchFamily="18"/>
+                                <a:cs typeface="Noto Serif" panose="02020502060505020204" pitchFamily="18"/>
+                              </a:rPr>
+                              <m:t>2</m:t>
+                            </m:r>
+                          </m:sub>
+                          <m:sup>
+                            <m:r>
+                              <a:rPr lang="en-US" b="0" i="1" smtClean="0">
+                                <a:latin typeface="Cambria Math" panose="02040503050406030204" pitchFamily="18" charset="0"/>
+                                <a:ea typeface="Noto Serif" panose="02020502060505020204" pitchFamily="18"/>
+                                <a:cs typeface="Noto Serif" panose="02020502060505020204" pitchFamily="18"/>
+                              </a:rPr>
+                              <m:t>𝑀</m:t>
+                            </m:r>
+                          </m:sup>
+                        </m:sSubSup>
+                      </m:oMath>
+                    </m:oMathPara>
+                  </a14:m>
+                  <a:endParaRPr lang="en-US" dirty="0">
+                    <a:latin typeface="Noto Serif" panose="02020502060505020204" pitchFamily="18"/>
+                    <a:ea typeface="Noto Serif" panose="02020502060505020204" pitchFamily="18"/>
+                    <a:cs typeface="Noto Serif" panose="02020502060505020204" pitchFamily="18"/>
+                  </a:endParaRPr>
+                </a:p>
+              </p:txBody>
+            </p:sp>
+          </mc:Choice>
+          <mc:Fallback>
+            <p:sp>
+              <p:nvSpPr>
+                <p:cNvPr id="31" name="TextBox 30">
+                  <a:extLst>
+                    <a:ext uri="{FF2B5EF4-FFF2-40B4-BE49-F238E27FC236}">
+                      <a16:creationId xmlns:a16="http://schemas.microsoft.com/office/drawing/2014/main" id="{C56D45B1-50B2-41EE-B21A-885CB116E81D}"/>
+                    </a:ext>
+                  </a:extLst>
+                </p:cNvPr>
+                <p:cNvSpPr txBox="1">
+                  <a:spLocks noRot="1" noChangeAspect="1" noMove="1" noResize="1" noEditPoints="1" noAdjustHandles="1" noChangeArrowheads="1" noChangeShapeType="1" noTextEdit="1"/>
+                </p:cNvSpPr>
+                <p:nvPr/>
+              </p:nvSpPr>
+              <p:spPr>
+                <a:xfrm>
+                  <a:off x="5804986" y="2900757"/>
+                  <a:ext cx="358199" cy="373179"/>
+                </a:xfrm>
+                <a:prstGeom prst="rect">
+                  <a:avLst/>
+                </a:prstGeom>
+                <a:blipFill>
+                  <a:blip r:embed="rId6"/>
+                  <a:stretch>
+                    <a:fillRect r="-22034" b="-1639"/>
+                  </a:stretch>
+                </a:blipFill>
+              </p:spPr>
+              <p:txBody>
+                <a:bodyPr/>
+                <a:lstStyle/>
+                <a:p>
+                  <a:r>
+                    <a:rPr lang="en-US">
+                      <a:noFill/>
+                    </a:rPr>
+                    <a:t> </a:t>
+                  </a:r>
+                </a:p>
+              </p:txBody>
+            </p:sp>
+          </mc:Fallback>
+        </mc:AlternateContent>
+      </p:grpSp>
+    </p:spTree>
+    <p:extLst>
+      <p:ext uri="{BB962C8B-B14F-4D97-AF65-F5344CB8AC3E}">
+        <p14:creationId xmlns:p14="http://schemas.microsoft.com/office/powerpoint/2010/main" val="3861528842"/>
+      </p:ext>
+    </p:extLst>
+  </p:cSld>
+  <p:clrMapOvr>
+    <a:masterClrMapping/>
+  </p:clrMapOvr>
+</p:sld>
+</file>
+
+<file path=ppt/slides/slide3.xml><?xml version="1.0" encoding="utf-8"?>
+<p:sld xmlns:a="http://schemas.openxmlformats.org/drawingml/2006/main" xmlns:r="http://schemas.openxmlformats.org/officeDocument/2006/relationships" xmlns:p="http://schemas.openxmlformats.org/presentationml/2006/main">
+  <p:cSld>
+    <p:spTree>
+      <p:nvGrpSpPr>
+        <p:cNvPr id="1" name=""/>
+        <p:cNvGrpSpPr/>
+        <p:nvPr/>
+      </p:nvGrpSpPr>
+      <p:grpSpPr>
+        <a:xfrm>
+          <a:off x="0" y="0"/>
+          <a:ext cx="0" cy="0"/>
+          <a:chOff x="0" y="0"/>
+          <a:chExt cx="0" cy="0"/>
+        </a:xfrm>
+      </p:grpSpPr>
+      <p:pic>
+        <p:nvPicPr>
+          <p:cNvPr id="4" name="Picture 3" descr="Shape, sunburst chart&#10;&#10;Description automatically generated">
+            <a:extLst>
+              <a:ext uri="{FF2B5EF4-FFF2-40B4-BE49-F238E27FC236}">
+                <a16:creationId xmlns:a16="http://schemas.microsoft.com/office/drawing/2014/main" id="{FE1E0A2D-5A96-4181-ABFD-518F510AEE1D}"/>
+              </a:ext>
+            </a:extLst>
+          </p:cNvPr>
+          <p:cNvPicPr>
+            <a:picLocks noChangeAspect="1"/>
+          </p:cNvPicPr>
+          <p:nvPr/>
+        </p:nvPicPr>
+        <p:blipFill>
+          <a:blip r:embed="rId2">
+            <a:extLst>
+              <a:ext uri="{28A0092B-C50C-407E-A947-70E740481C1C}">
+                <a14:useLocalDpi xmlns:a14="http://schemas.microsoft.com/office/drawing/2010/main" val="0"/>
+              </a:ext>
+            </a:extLst>
+          </a:blip>
+          <a:stretch>
+            <a:fillRect/>
+          </a:stretch>
+        </p:blipFill>
+        <p:spPr>
+          <a:xfrm>
+            <a:off x="8645866" y="3194169"/>
+            <a:ext cx="2591659" cy="2574683"/>
+          </a:xfrm>
+          <a:prstGeom prst="rect">
+            <a:avLst/>
+          </a:prstGeom>
+        </p:spPr>
+      </p:pic>
+      <p:sp>
+        <p:nvSpPr>
+          <p:cNvPr id="5" name="TextBox 4">
+            <a:extLst>
+              <a:ext uri="{FF2B5EF4-FFF2-40B4-BE49-F238E27FC236}">
+                <a16:creationId xmlns:a16="http://schemas.microsoft.com/office/drawing/2014/main" id="{372777F1-CC31-42B9-9F63-14EFEAB2D1E2}"/>
+              </a:ext>
+            </a:extLst>
+          </p:cNvPr>
+          <p:cNvSpPr txBox="1"/>
+          <p:nvPr/>
+        </p:nvSpPr>
+        <p:spPr>
+          <a:xfrm>
+            <a:off x="7356484" y="1156332"/>
+            <a:ext cx="256802" cy="369332"/>
+          </a:xfrm>
+          <a:prstGeom prst="rect">
+            <a:avLst/>
+          </a:prstGeom>
+          <a:noFill/>
+        </p:spPr>
+        <p:txBody>
+          <a:bodyPr wrap="none" rtlCol="0">
+            <a:spAutoFit/>
+          </a:bodyPr>
+          <a:lstStyle/>
+          <a:p>
+            <a:r>
+              <a:rPr lang="en-US" i="1" dirty="0">
+                <a:latin typeface="Noto Serif" panose="02020502060505020204" pitchFamily="18"/>
+                <a:ea typeface="Noto Serif" panose="02020502060505020204" pitchFamily="18"/>
+                <a:cs typeface="Noto Serif" panose="02020502060505020204" pitchFamily="18"/>
+              </a:rPr>
+              <a:t>l</a:t>
+            </a:r>
+          </a:p>
+        </p:txBody>
+      </p:sp>
+      <p:sp>
+        <p:nvSpPr>
+          <p:cNvPr id="6" name="Oval 5">
+            <a:extLst>
+              <a:ext uri="{FF2B5EF4-FFF2-40B4-BE49-F238E27FC236}">
+                <a16:creationId xmlns:a16="http://schemas.microsoft.com/office/drawing/2014/main" id="{541558C1-03A5-4E51-AB8A-1043BF2C3DB6}"/>
+              </a:ext>
+            </a:extLst>
+          </p:cNvPr>
+          <p:cNvSpPr>
+            <a:spLocks noChangeAspect="1"/>
+          </p:cNvSpPr>
+          <p:nvPr/>
+        </p:nvSpPr>
+        <p:spPr>
+          <a:xfrm>
+            <a:off x="7850006" y="2881311"/>
+            <a:ext cx="91440" cy="91440"/>
+          </a:xfrm>
+          <a:prstGeom prst="ellipse">
+            <a:avLst/>
+          </a:prstGeom>
+          <a:solidFill>
+            <a:schemeClr val="dk1"/>
+          </a:solidFill>
+          <a:ln>
+            <a:noFill/>
+          </a:ln>
+        </p:spPr>
+        <p:style>
+          <a:lnRef idx="0">
+            <a:scrgbClr r="0" g="0" b="0"/>
+          </a:lnRef>
+          <a:fillRef idx="0">
+            <a:scrgbClr r="0" g="0" b="0"/>
+          </a:fillRef>
+          <a:effectRef idx="0">
+            <a:scrgbClr r="0" g="0" b="0"/>
+          </a:effectRef>
+          <a:fontRef idx="minor">
+            <a:schemeClr val="lt1"/>
+          </a:fontRef>
+        </p:style>
+        <p:txBody>
+          <a:bodyPr rtlCol="0" anchor="ctr"/>
+          <a:lstStyle/>
+          <a:p>
+            <a:pPr algn="ctr"/>
+            <a:endParaRPr lang="en-US"/>
+          </a:p>
+        </p:txBody>
+      </p:sp>
+      <p:sp>
+        <p:nvSpPr>
+          <p:cNvPr id="7" name="Oval 6">
+            <a:extLst>
+              <a:ext uri="{FF2B5EF4-FFF2-40B4-BE49-F238E27FC236}">
+                <a16:creationId xmlns:a16="http://schemas.microsoft.com/office/drawing/2014/main" id="{B7420F00-2135-496B-95D5-CFA1CA64EC2D}"/>
+              </a:ext>
+            </a:extLst>
+          </p:cNvPr>
+          <p:cNvSpPr>
+            <a:spLocks noChangeAspect="1"/>
+          </p:cNvSpPr>
+          <p:nvPr/>
+        </p:nvSpPr>
+        <p:spPr>
+          <a:xfrm>
+            <a:off x="6383156" y="881061"/>
+            <a:ext cx="91440" cy="91440"/>
+          </a:xfrm>
+          <a:prstGeom prst="ellipse">
+            <a:avLst/>
+          </a:prstGeom>
+          <a:solidFill>
+            <a:schemeClr val="dk1"/>
+          </a:solidFill>
+          <a:ln>
+            <a:noFill/>
+          </a:ln>
+        </p:spPr>
+        <p:style>
+          <a:lnRef idx="0">
+            <a:scrgbClr r="0" g="0" b="0"/>
+          </a:lnRef>
+          <a:fillRef idx="0">
+            <a:scrgbClr r="0" g="0" b="0"/>
+          </a:fillRef>
+          <a:effectRef idx="0">
+            <a:scrgbClr r="0" g="0" b="0"/>
+          </a:effectRef>
+          <a:fontRef idx="minor">
+            <a:schemeClr val="lt1"/>
+          </a:fontRef>
+        </p:style>
+        <p:txBody>
+          <a:bodyPr rtlCol="0" anchor="ctr"/>
+          <a:lstStyle/>
+          <a:p>
+            <a:pPr algn="ctr"/>
+            <a:endParaRPr lang="en-US"/>
+          </a:p>
+        </p:txBody>
+      </p:sp>
+      <p:sp>
+        <p:nvSpPr>
+          <p:cNvPr id="8" name="Oval 7">
+            <a:extLst>
+              <a:ext uri="{FF2B5EF4-FFF2-40B4-BE49-F238E27FC236}">
+                <a16:creationId xmlns:a16="http://schemas.microsoft.com/office/drawing/2014/main" id="{0D19EFB3-9C6F-4075-83F5-789D718E678E}"/>
+              </a:ext>
+            </a:extLst>
+          </p:cNvPr>
+          <p:cNvSpPr>
+            <a:spLocks noChangeAspect="1"/>
+          </p:cNvSpPr>
+          <p:nvPr/>
+        </p:nvSpPr>
+        <p:spPr>
+          <a:xfrm>
+            <a:off x="4030481" y="1643061"/>
+            <a:ext cx="91440" cy="91440"/>
+          </a:xfrm>
+          <a:prstGeom prst="ellipse">
+            <a:avLst/>
+          </a:prstGeom>
+          <a:solidFill>
+            <a:schemeClr val="dk1"/>
+          </a:solidFill>
+          <a:ln>
+            <a:noFill/>
+          </a:ln>
+        </p:spPr>
+        <p:style>
+          <a:lnRef idx="0">
+            <a:scrgbClr r="0" g="0" b="0"/>
+          </a:lnRef>
+          <a:fillRef idx="0">
+            <a:scrgbClr r="0" g="0" b="0"/>
+          </a:fillRef>
+          <a:effectRef idx="0">
+            <a:scrgbClr r="0" g="0" b="0"/>
+          </a:effectRef>
+          <a:fontRef idx="minor">
+            <a:schemeClr val="lt1"/>
+          </a:fontRef>
+        </p:style>
+        <p:txBody>
+          <a:bodyPr rtlCol="0" anchor="ctr"/>
+          <a:lstStyle/>
+          <a:p>
+            <a:pPr algn="ctr"/>
+            <a:endParaRPr lang="en-US"/>
+          </a:p>
+        </p:txBody>
+      </p:sp>
+      <p:sp>
+        <p:nvSpPr>
+          <p:cNvPr id="9" name="Oval 8">
+            <a:extLst>
+              <a:ext uri="{FF2B5EF4-FFF2-40B4-BE49-F238E27FC236}">
+                <a16:creationId xmlns:a16="http://schemas.microsoft.com/office/drawing/2014/main" id="{7CAE8D2E-CD38-4960-B982-D54CD3DE72B0}"/>
+              </a:ext>
+            </a:extLst>
+          </p:cNvPr>
+          <p:cNvSpPr>
+            <a:spLocks noChangeAspect="1"/>
+          </p:cNvSpPr>
+          <p:nvPr/>
+        </p:nvSpPr>
+        <p:spPr>
+          <a:xfrm>
+            <a:off x="3630431" y="2881311"/>
+            <a:ext cx="91440" cy="91440"/>
+          </a:xfrm>
+          <a:prstGeom prst="ellipse">
+            <a:avLst/>
+          </a:prstGeom>
+          <a:solidFill>
+            <a:schemeClr val="dk1"/>
+          </a:solidFill>
+          <a:ln>
+            <a:noFill/>
+          </a:ln>
+        </p:spPr>
+        <p:style>
+          <a:lnRef idx="0">
+            <a:scrgbClr r="0" g="0" b="0"/>
+          </a:lnRef>
+          <a:fillRef idx="0">
+            <a:scrgbClr r="0" g="0" b="0"/>
+          </a:fillRef>
+          <a:effectRef idx="0">
+            <a:scrgbClr r="0" g="0" b="0"/>
+          </a:effectRef>
+          <a:fontRef idx="minor">
+            <a:schemeClr val="lt1"/>
+          </a:fontRef>
+        </p:style>
+        <p:txBody>
+          <a:bodyPr rtlCol="0" anchor="ctr"/>
+          <a:lstStyle/>
+          <a:p>
+            <a:pPr algn="ctr"/>
+            <a:endParaRPr lang="en-US"/>
+          </a:p>
+        </p:txBody>
+      </p:sp>
+      <p:sp>
+        <p:nvSpPr>
+          <p:cNvPr id="10" name="Oval 9">
+            <a:extLst>
+              <a:ext uri="{FF2B5EF4-FFF2-40B4-BE49-F238E27FC236}">
+                <a16:creationId xmlns:a16="http://schemas.microsoft.com/office/drawing/2014/main" id="{85ECFC1A-E6F4-4523-BE9F-A591E4B515C3}"/>
+              </a:ext>
+            </a:extLst>
+          </p:cNvPr>
+          <p:cNvSpPr>
+            <a:spLocks noChangeAspect="1"/>
+          </p:cNvSpPr>
+          <p:nvPr/>
+        </p:nvSpPr>
+        <p:spPr>
+          <a:xfrm>
+            <a:off x="5735456" y="4986336"/>
+            <a:ext cx="91440" cy="91440"/>
+          </a:xfrm>
+          <a:prstGeom prst="ellipse">
+            <a:avLst/>
+          </a:prstGeom>
+          <a:solidFill>
+            <a:schemeClr val="dk1"/>
+          </a:solidFill>
+          <a:ln>
+            <a:noFill/>
+          </a:ln>
+        </p:spPr>
+        <p:style>
+          <a:lnRef idx="0">
+            <a:scrgbClr r="0" g="0" b="0"/>
+          </a:lnRef>
+          <a:fillRef idx="0">
+            <a:scrgbClr r="0" g="0" b="0"/>
+          </a:fillRef>
+          <a:effectRef idx="0">
+            <a:scrgbClr r="0" g="0" b="0"/>
+          </a:effectRef>
+          <a:fontRef idx="minor">
+            <a:schemeClr val="lt1"/>
+          </a:fontRef>
+        </p:style>
+        <p:txBody>
+          <a:bodyPr rtlCol="0" anchor="ctr"/>
+          <a:lstStyle/>
+          <a:p>
+            <a:pPr algn="ctr"/>
+            <a:endParaRPr lang="en-US"/>
+          </a:p>
+        </p:txBody>
+      </p:sp>
+      <p:sp>
+        <p:nvSpPr>
+          <p:cNvPr id="11" name="Oval 10">
+            <a:extLst>
+              <a:ext uri="{FF2B5EF4-FFF2-40B4-BE49-F238E27FC236}">
+                <a16:creationId xmlns:a16="http://schemas.microsoft.com/office/drawing/2014/main" id="{65173C13-0F8E-43A4-A5E8-212F2F8FB3FD}"/>
+              </a:ext>
+            </a:extLst>
+          </p:cNvPr>
+          <p:cNvSpPr>
+            <a:spLocks noChangeAspect="1"/>
+          </p:cNvSpPr>
+          <p:nvPr/>
+        </p:nvSpPr>
+        <p:spPr>
+          <a:xfrm>
+            <a:off x="6373631" y="4891086"/>
+            <a:ext cx="91440" cy="91440"/>
+          </a:xfrm>
+          <a:prstGeom prst="ellipse">
+            <a:avLst/>
+          </a:prstGeom>
+          <a:solidFill>
+            <a:schemeClr val="dk1"/>
+          </a:solidFill>
+          <a:ln>
+            <a:noFill/>
+          </a:ln>
+        </p:spPr>
+        <p:style>
+          <a:lnRef idx="0">
+            <a:scrgbClr r="0" g="0" b="0"/>
+          </a:lnRef>
+          <a:fillRef idx="0">
+            <a:scrgbClr r="0" g="0" b="0"/>
+          </a:fillRef>
+          <a:effectRef idx="0">
+            <a:scrgbClr r="0" g="0" b="0"/>
+          </a:effectRef>
+          <a:fontRef idx="minor">
+            <a:schemeClr val="lt1"/>
+          </a:fontRef>
+        </p:style>
+        <p:txBody>
+          <a:bodyPr rtlCol="0" anchor="ctr"/>
+          <a:lstStyle/>
+          <a:p>
+            <a:pPr algn="ctr"/>
+            <a:endParaRPr lang="en-US"/>
+          </a:p>
+        </p:txBody>
+      </p:sp>
+      <p:sp>
+        <p:nvSpPr>
+          <p:cNvPr id="18" name="Oval 17">
+            <a:extLst>
+              <a:ext uri="{FF2B5EF4-FFF2-40B4-BE49-F238E27FC236}">
+                <a16:creationId xmlns:a16="http://schemas.microsoft.com/office/drawing/2014/main" id="{2A15A185-C40F-46C9-AF8F-6B7196972027}"/>
+              </a:ext>
+            </a:extLst>
+          </p:cNvPr>
+          <p:cNvSpPr>
+            <a:spLocks noChangeAspect="1"/>
+          </p:cNvSpPr>
+          <p:nvPr/>
+        </p:nvSpPr>
+        <p:spPr>
+          <a:xfrm>
+            <a:off x="7453290" y="4119561"/>
+            <a:ext cx="91440" cy="91440"/>
+          </a:xfrm>
+          <a:prstGeom prst="ellipse">
+            <a:avLst/>
+          </a:prstGeom>
+          <a:solidFill>
+            <a:schemeClr val="dk1"/>
+          </a:solidFill>
+          <a:ln>
+            <a:noFill/>
+          </a:ln>
+        </p:spPr>
+        <p:style>
+          <a:lnRef idx="0">
+            <a:scrgbClr r="0" g="0" b="0"/>
+          </a:lnRef>
+          <a:fillRef idx="0">
+            <a:scrgbClr r="0" g="0" b="0"/>
+          </a:fillRef>
+          <a:effectRef idx="0">
+            <a:scrgbClr r="0" g="0" b="0"/>
+          </a:effectRef>
+          <a:fontRef idx="minor">
+            <a:schemeClr val="lt1"/>
+          </a:fontRef>
+        </p:style>
+        <p:txBody>
+          <a:bodyPr rtlCol="0" anchor="ctr"/>
+          <a:lstStyle/>
+          <a:p>
+            <a:pPr algn="ctr"/>
+            <a:endParaRPr lang="en-US"/>
+          </a:p>
+        </p:txBody>
+      </p:sp>
+      <p:sp>
+        <p:nvSpPr>
+          <p:cNvPr id="2" name="Oval 1">
+            <a:extLst>
+              <a:ext uri="{FF2B5EF4-FFF2-40B4-BE49-F238E27FC236}">
+                <a16:creationId xmlns:a16="http://schemas.microsoft.com/office/drawing/2014/main" id="{A8B4A6FD-7CFD-49E6-8E13-5BAA11D8F136}"/>
+              </a:ext>
+            </a:extLst>
+          </p:cNvPr>
+          <p:cNvSpPr>
+            <a:spLocks noChangeAspect="1"/>
+          </p:cNvSpPr>
+          <p:nvPr/>
+        </p:nvSpPr>
+        <p:spPr>
+          <a:xfrm>
+            <a:off x="3681410" y="823911"/>
+            <a:ext cx="4206240" cy="4206240"/>
+          </a:xfrm>
+          <a:prstGeom prst="ellipse">
+            <a:avLst/>
+          </a:prstGeom>
+          <a:noFill/>
+          <a:ln w="19050" cap="flat" cmpd="sng" algn="ctr">
+            <a:solidFill>
+              <a:schemeClr val="dk1"/>
+            </a:solidFill>
+            <a:prstDash val="solid"/>
+            <a:round/>
+            <a:headEnd type="none" w="med" len="med"/>
+            <a:tailEnd type="none" w="med" len="med"/>
+          </a:ln>
+        </p:spPr>
+        <p:style>
+          <a:lnRef idx="0">
+            <a:scrgbClr r="0" g="0" b="0"/>
+          </a:lnRef>
+          <a:fillRef idx="0">
+            <a:scrgbClr r="0" g="0" b="0"/>
+          </a:fillRef>
+          <a:effectRef idx="0">
+            <a:scrgbClr r="0" g="0" b="0"/>
+          </a:effectRef>
+          <a:fontRef idx="minor">
+            <a:schemeClr val="dk1"/>
+          </a:fontRef>
+        </p:style>
+        <p:txBody>
+          <a:bodyPr rtlCol="0" anchor="ctr"/>
+          <a:lstStyle/>
+          <a:p>
+            <a:pPr algn="ctr"/>
+            <a:endParaRPr lang="en-US"/>
+          </a:p>
+        </p:txBody>
+      </p:sp>
+      <p:sp>
+        <p:nvSpPr>
+          <p:cNvPr id="13" name="Oval 12">
+            <a:extLst>
+              <a:ext uri="{FF2B5EF4-FFF2-40B4-BE49-F238E27FC236}">
+                <a16:creationId xmlns:a16="http://schemas.microsoft.com/office/drawing/2014/main" id="{D730998D-AFAE-4DAD-91B7-D5A48EB18B30}"/>
+              </a:ext>
+            </a:extLst>
+          </p:cNvPr>
+          <p:cNvSpPr>
+            <a:spLocks noChangeAspect="1"/>
+          </p:cNvSpPr>
+          <p:nvPr/>
+        </p:nvSpPr>
+        <p:spPr>
+          <a:xfrm>
+            <a:off x="3864290" y="1006791"/>
+            <a:ext cx="3840480" cy="3840480"/>
+          </a:xfrm>
+          <a:prstGeom prst="ellipse">
+            <a:avLst/>
+          </a:prstGeom>
+          <a:noFill/>
+          <a:ln w="19050" cap="flat" cmpd="sng" algn="ctr">
+            <a:solidFill>
+              <a:schemeClr val="accent6"/>
+            </a:solidFill>
+            <a:prstDash val="solid"/>
+            <a:round/>
+            <a:headEnd type="none" w="med" len="med"/>
+            <a:tailEnd type="none" w="med" len="med"/>
+          </a:ln>
+        </p:spPr>
+        <p:style>
+          <a:lnRef idx="0">
+            <a:scrgbClr r="0" g="0" b="0"/>
+          </a:lnRef>
+          <a:fillRef idx="0">
+            <a:scrgbClr r="0" g="0" b="0"/>
+          </a:fillRef>
+          <a:effectRef idx="0">
+            <a:scrgbClr r="0" g="0" b="0"/>
+          </a:effectRef>
+          <a:fontRef idx="minor">
+            <a:schemeClr val="dk1"/>
+          </a:fontRef>
+        </p:style>
+        <p:txBody>
+          <a:bodyPr rtlCol="0" anchor="ctr"/>
+          <a:lstStyle/>
+          <a:p>
+            <a:pPr algn="ctr"/>
+            <a:endParaRPr lang="en-US"/>
+          </a:p>
+        </p:txBody>
+      </p:sp>
+      <p:sp>
+        <p:nvSpPr>
+          <p:cNvPr id="16" name="Arc 15">
+            <a:extLst>
+              <a:ext uri="{FF2B5EF4-FFF2-40B4-BE49-F238E27FC236}">
+                <a16:creationId xmlns:a16="http://schemas.microsoft.com/office/drawing/2014/main" id="{496507E1-5857-48E9-A984-15763F45BC15}"/>
+              </a:ext>
+            </a:extLst>
+          </p:cNvPr>
+          <p:cNvSpPr>
+            <a:spLocks noChangeAspect="1"/>
+          </p:cNvSpPr>
+          <p:nvPr/>
+        </p:nvSpPr>
+        <p:spPr>
+          <a:xfrm>
+            <a:off x="4047170" y="1189671"/>
+            <a:ext cx="3474720" cy="3474720"/>
+          </a:xfrm>
+          <a:prstGeom prst="arc">
+            <a:avLst>
+              <a:gd name="adj1" fmla="val 5400000"/>
+              <a:gd name="adj2" fmla="val 17280250"/>
+            </a:avLst>
+          </a:prstGeom>
+          <a:noFill/>
+          <a:ln w="19050" cap="flat" cmpd="sng" algn="ctr">
+            <a:solidFill>
+              <a:schemeClr val="accent2"/>
+            </a:solidFill>
+            <a:prstDash val="solid"/>
+            <a:round/>
+            <a:headEnd type="none" w="med" len="med"/>
+            <a:tailEnd type="none" w="med" len="med"/>
+          </a:ln>
+        </p:spPr>
+        <p:style>
+          <a:lnRef idx="0">
+            <a:scrgbClr r="0" g="0" b="0"/>
+          </a:lnRef>
+          <a:fillRef idx="0">
+            <a:scrgbClr r="0" g="0" b="0"/>
+          </a:fillRef>
+          <a:effectRef idx="0">
+            <a:scrgbClr r="0" g="0" b="0"/>
+          </a:effectRef>
+          <a:fontRef idx="minor">
+            <a:schemeClr val="dk1"/>
+          </a:fontRef>
+        </p:style>
+        <p:txBody>
+          <a:bodyPr rtlCol="0" anchor="ctr"/>
+          <a:lstStyle/>
+          <a:p>
+            <a:pPr algn="ctr"/>
+            <a:endParaRPr lang="en-US"/>
+          </a:p>
+        </p:txBody>
+      </p:sp>
+      <p:sp>
+        <p:nvSpPr>
+          <p:cNvPr id="17" name="Arc 16">
+            <a:extLst>
+              <a:ext uri="{FF2B5EF4-FFF2-40B4-BE49-F238E27FC236}">
+                <a16:creationId xmlns:a16="http://schemas.microsoft.com/office/drawing/2014/main" id="{E5352E30-F111-41AF-8F10-3F1AD8830F99}"/>
+              </a:ext>
+            </a:extLst>
+          </p:cNvPr>
+          <p:cNvSpPr>
+            <a:spLocks noChangeAspect="1"/>
+          </p:cNvSpPr>
+          <p:nvPr/>
+        </p:nvSpPr>
+        <p:spPr>
+          <a:xfrm>
+            <a:off x="4230050" y="1372551"/>
+            <a:ext cx="3108960" cy="3108960"/>
+          </a:xfrm>
+          <a:prstGeom prst="arc">
+            <a:avLst>
+              <a:gd name="adj1" fmla="val 10800000"/>
+              <a:gd name="adj2" fmla="val 2173497"/>
+            </a:avLst>
+          </a:prstGeom>
+          <a:noFill/>
+          <a:ln w="19050" cap="flat" cmpd="sng" algn="ctr">
+            <a:solidFill>
+              <a:schemeClr val="accent5"/>
+            </a:solidFill>
+            <a:prstDash val="solid"/>
+            <a:round/>
+            <a:headEnd type="none" w="med" len="med"/>
+            <a:tailEnd type="none" w="med" len="med"/>
+          </a:ln>
+        </p:spPr>
+        <p:style>
+          <a:lnRef idx="0">
+            <a:scrgbClr r="0" g="0" b="0"/>
+          </a:lnRef>
+          <a:fillRef idx="0">
+            <a:scrgbClr r="0" g="0" b="0"/>
+          </a:fillRef>
+          <a:effectRef idx="0">
+            <a:scrgbClr r="0" g="0" b="0"/>
+          </a:effectRef>
+          <a:fontRef idx="minor">
+            <a:schemeClr val="dk1"/>
+          </a:fontRef>
+        </p:style>
+        <p:txBody>
+          <a:bodyPr rtlCol="0" anchor="ctr"/>
+          <a:lstStyle/>
+          <a:p>
+            <a:pPr algn="ctr"/>
+            <a:endParaRPr lang="en-US"/>
+          </a:p>
+        </p:txBody>
+      </p:sp>
+      <p:sp>
+        <p:nvSpPr>
+          <p:cNvPr id="42" name="Arc 41">
+            <a:extLst>
+              <a:ext uri="{FF2B5EF4-FFF2-40B4-BE49-F238E27FC236}">
+                <a16:creationId xmlns:a16="http://schemas.microsoft.com/office/drawing/2014/main" id="{E7E7ED66-8503-40EB-96DD-A5C2E4FD3B3C}"/>
+              </a:ext>
+            </a:extLst>
+          </p:cNvPr>
+          <p:cNvSpPr>
+            <a:spLocks noChangeAspect="1"/>
+          </p:cNvSpPr>
+          <p:nvPr/>
+        </p:nvSpPr>
+        <p:spPr>
+          <a:xfrm>
+            <a:off x="4412930" y="1555431"/>
+            <a:ext cx="2743200" cy="2743200"/>
+          </a:xfrm>
+          <a:prstGeom prst="arc">
+            <a:avLst>
+              <a:gd name="adj1" fmla="val 4365512"/>
+              <a:gd name="adj2" fmla="val 12968880"/>
+            </a:avLst>
+          </a:prstGeom>
+          <a:noFill/>
+          <a:ln w="19050" cap="flat" cmpd="sng" algn="ctr">
+            <a:solidFill>
+              <a:schemeClr val="accent4"/>
+            </a:solidFill>
+            <a:prstDash val="solid"/>
+            <a:round/>
+            <a:headEnd type="none" w="med" len="med"/>
+            <a:tailEnd type="none" w="med" len="med"/>
+          </a:ln>
+        </p:spPr>
+        <p:style>
+          <a:lnRef idx="0">
+            <a:scrgbClr r="0" g="0" b="0"/>
+          </a:lnRef>
+          <a:fillRef idx="0">
+            <a:scrgbClr r="0" g="0" b="0"/>
+          </a:fillRef>
+          <a:effectRef idx="0">
+            <a:scrgbClr r="0" g="0" b="0"/>
+          </a:effectRef>
+          <a:fontRef idx="minor">
+            <a:schemeClr val="dk1"/>
+          </a:fontRef>
+        </p:style>
+        <p:txBody>
+          <a:bodyPr rtlCol="0" anchor="ctr"/>
+          <a:lstStyle/>
+          <a:p>
+            <a:pPr algn="ctr"/>
+            <a:endParaRPr lang="en-US"/>
+          </a:p>
+        </p:txBody>
+      </p:sp>
+      <p:sp>
+        <p:nvSpPr>
+          <p:cNvPr id="49" name="Oval 48">
+            <a:extLst>
+              <a:ext uri="{FF2B5EF4-FFF2-40B4-BE49-F238E27FC236}">
+                <a16:creationId xmlns:a16="http://schemas.microsoft.com/office/drawing/2014/main" id="{BEFD3622-9491-45B8-9889-1E3959738161}"/>
+              </a:ext>
+            </a:extLst>
+          </p:cNvPr>
+          <p:cNvSpPr>
+            <a:spLocks noChangeAspect="1"/>
+          </p:cNvSpPr>
+          <p:nvPr/>
+        </p:nvSpPr>
+        <p:spPr>
+          <a:xfrm>
+            <a:off x="6282191" y="1233486"/>
+            <a:ext cx="91440" cy="91440"/>
+          </a:xfrm>
+          <a:prstGeom prst="ellipse">
+            <a:avLst/>
+          </a:prstGeom>
+          <a:solidFill>
+            <a:schemeClr val="accent2"/>
+          </a:solidFill>
+          <a:ln>
+            <a:noFill/>
+          </a:ln>
+        </p:spPr>
+        <p:style>
+          <a:lnRef idx="0">
+            <a:scrgbClr r="0" g="0" b="0"/>
+          </a:lnRef>
+          <a:fillRef idx="0">
+            <a:scrgbClr r="0" g="0" b="0"/>
+          </a:fillRef>
+          <a:effectRef idx="0">
+            <a:scrgbClr r="0" g="0" b="0"/>
+          </a:effectRef>
+          <a:fontRef idx="minor">
+            <a:schemeClr val="lt1"/>
+          </a:fontRef>
+        </p:style>
+        <p:txBody>
+          <a:bodyPr rtlCol="0" anchor="ctr"/>
+          <a:lstStyle/>
+          <a:p>
+            <a:pPr algn="ctr"/>
+            <a:endParaRPr lang="en-US"/>
+          </a:p>
+        </p:txBody>
+      </p:sp>
+      <p:sp>
+        <p:nvSpPr>
+          <p:cNvPr id="50" name="Oval 49">
+            <a:extLst>
+              <a:ext uri="{FF2B5EF4-FFF2-40B4-BE49-F238E27FC236}">
+                <a16:creationId xmlns:a16="http://schemas.microsoft.com/office/drawing/2014/main" id="{C9FCBA5B-0BBB-47C1-8DD7-273E47A8D126}"/>
+              </a:ext>
+            </a:extLst>
+          </p:cNvPr>
+          <p:cNvSpPr>
+            <a:spLocks noChangeAspect="1"/>
+          </p:cNvSpPr>
+          <p:nvPr/>
+        </p:nvSpPr>
+        <p:spPr>
+          <a:xfrm>
+            <a:off x="5730648" y="4628670"/>
+            <a:ext cx="91440" cy="91440"/>
+          </a:xfrm>
+          <a:prstGeom prst="ellipse">
+            <a:avLst/>
+          </a:prstGeom>
+          <a:solidFill>
+            <a:schemeClr val="accent2"/>
+          </a:solidFill>
+          <a:ln>
+            <a:noFill/>
+          </a:ln>
+        </p:spPr>
+        <p:style>
+          <a:lnRef idx="0">
+            <a:scrgbClr r="0" g="0" b="0"/>
+          </a:lnRef>
+          <a:fillRef idx="0">
+            <a:scrgbClr r="0" g="0" b="0"/>
+          </a:fillRef>
+          <a:effectRef idx="0">
+            <a:scrgbClr r="0" g="0" b="0"/>
+          </a:effectRef>
+          <a:fontRef idx="minor">
+            <a:schemeClr val="lt1"/>
+          </a:fontRef>
+        </p:style>
+        <p:txBody>
+          <a:bodyPr rtlCol="0" anchor="ctr"/>
+          <a:lstStyle/>
+          <a:p>
+            <a:pPr algn="ctr"/>
+            <a:endParaRPr lang="en-US"/>
+          </a:p>
+        </p:txBody>
+      </p:sp>
+      <p:sp>
+        <p:nvSpPr>
+          <p:cNvPr id="51" name="Oval 50">
+            <a:extLst>
+              <a:ext uri="{FF2B5EF4-FFF2-40B4-BE49-F238E27FC236}">
+                <a16:creationId xmlns:a16="http://schemas.microsoft.com/office/drawing/2014/main" id="{15FF3CFD-0FC0-4A6A-9C8C-3C467985D111}"/>
+              </a:ext>
+            </a:extLst>
+          </p:cNvPr>
+          <p:cNvSpPr>
+            <a:spLocks noChangeAspect="1"/>
+          </p:cNvSpPr>
+          <p:nvPr/>
+        </p:nvSpPr>
+        <p:spPr>
+          <a:xfrm>
+            <a:off x="6987041" y="3795711"/>
+            <a:ext cx="91440" cy="91440"/>
+          </a:xfrm>
+          <a:prstGeom prst="ellipse">
+            <a:avLst/>
+          </a:prstGeom>
+          <a:solidFill>
+            <a:schemeClr val="accent5"/>
+          </a:solidFill>
+          <a:ln>
+            <a:noFill/>
+          </a:ln>
+        </p:spPr>
+        <p:style>
+          <a:lnRef idx="0">
+            <a:scrgbClr r="0" g="0" b="0"/>
+          </a:lnRef>
+          <a:fillRef idx="0">
+            <a:scrgbClr r="0" g="0" b="0"/>
+          </a:fillRef>
+          <a:effectRef idx="0">
+            <a:scrgbClr r="0" g="0" b="0"/>
+          </a:effectRef>
+          <a:fontRef idx="minor">
+            <a:schemeClr val="lt1"/>
+          </a:fontRef>
+        </p:style>
+        <p:txBody>
+          <a:bodyPr rtlCol="0" anchor="ctr"/>
+          <a:lstStyle/>
+          <a:p>
+            <a:pPr algn="ctr"/>
+            <a:endParaRPr lang="en-US"/>
+          </a:p>
+        </p:txBody>
+      </p:sp>
+      <p:sp>
+        <p:nvSpPr>
+          <p:cNvPr id="52" name="Oval 51">
+            <a:extLst>
+              <a:ext uri="{FF2B5EF4-FFF2-40B4-BE49-F238E27FC236}">
+                <a16:creationId xmlns:a16="http://schemas.microsoft.com/office/drawing/2014/main" id="{A9B3AA73-F725-459C-8460-396019DFDA37}"/>
+              </a:ext>
+            </a:extLst>
+          </p:cNvPr>
+          <p:cNvSpPr>
+            <a:spLocks noChangeAspect="1"/>
+          </p:cNvSpPr>
+          <p:nvPr/>
+        </p:nvSpPr>
+        <p:spPr>
+          <a:xfrm>
+            <a:off x="7654263" y="2881311"/>
+            <a:ext cx="91440" cy="91440"/>
+          </a:xfrm>
+          <a:prstGeom prst="ellipse">
+            <a:avLst/>
+          </a:prstGeom>
+          <a:solidFill>
+            <a:schemeClr val="accent6"/>
+          </a:solidFill>
+          <a:ln>
+            <a:noFill/>
+          </a:ln>
+        </p:spPr>
+        <p:style>
+          <a:lnRef idx="0">
+            <a:scrgbClr r="0" g="0" b="0"/>
+          </a:lnRef>
+          <a:fillRef idx="0">
+            <a:scrgbClr r="0" g="0" b="0"/>
+          </a:fillRef>
+          <a:effectRef idx="0">
+            <a:scrgbClr r="0" g="0" b="0"/>
+          </a:effectRef>
+          <a:fontRef idx="minor">
+            <a:schemeClr val="lt1"/>
+          </a:fontRef>
+        </p:style>
+        <p:txBody>
+          <a:bodyPr rtlCol="0" anchor="ctr"/>
+          <a:lstStyle/>
+          <a:p>
+            <a:pPr algn="ctr"/>
+            <a:endParaRPr lang="en-US"/>
+          </a:p>
+        </p:txBody>
+      </p:sp>
+      <p:sp>
+        <p:nvSpPr>
+          <p:cNvPr id="53" name="Oval 52">
+            <a:extLst>
+              <a:ext uri="{FF2B5EF4-FFF2-40B4-BE49-F238E27FC236}">
+                <a16:creationId xmlns:a16="http://schemas.microsoft.com/office/drawing/2014/main" id="{7F4C9FDF-9F93-48AA-917C-FE56D62E236D}"/>
+              </a:ext>
+            </a:extLst>
+          </p:cNvPr>
+          <p:cNvSpPr>
+            <a:spLocks noChangeAspect="1"/>
+          </p:cNvSpPr>
+          <p:nvPr/>
+        </p:nvSpPr>
+        <p:spPr>
+          <a:xfrm>
+            <a:off x="4185747" y="2881311"/>
+            <a:ext cx="91440" cy="91440"/>
+          </a:xfrm>
+          <a:prstGeom prst="ellipse">
+            <a:avLst/>
+          </a:prstGeom>
+          <a:solidFill>
+            <a:schemeClr val="accent5"/>
+          </a:solidFill>
+          <a:ln>
+            <a:noFill/>
+          </a:ln>
+        </p:spPr>
+        <p:style>
+          <a:lnRef idx="0">
+            <a:scrgbClr r="0" g="0" b="0"/>
+          </a:lnRef>
+          <a:fillRef idx="0">
+            <a:scrgbClr r="0" g="0" b="0"/>
+          </a:fillRef>
+          <a:effectRef idx="0">
+            <a:scrgbClr r="0" g="0" b="0"/>
+          </a:effectRef>
+          <a:fontRef idx="minor">
+            <a:schemeClr val="lt1"/>
+          </a:fontRef>
+        </p:style>
+        <p:txBody>
+          <a:bodyPr rtlCol="0" anchor="ctr"/>
+          <a:lstStyle/>
+          <a:p>
+            <a:pPr algn="ctr"/>
+            <a:endParaRPr lang="en-US"/>
+          </a:p>
+        </p:txBody>
+      </p:sp>
+      <p:sp>
+        <p:nvSpPr>
+          <p:cNvPr id="54" name="Oval 53">
+            <a:extLst>
+              <a:ext uri="{FF2B5EF4-FFF2-40B4-BE49-F238E27FC236}">
+                <a16:creationId xmlns:a16="http://schemas.microsoft.com/office/drawing/2014/main" id="{34D85E5A-1B71-4F1E-8E4A-EC5E4B4EFC6B}"/>
+              </a:ext>
+            </a:extLst>
+          </p:cNvPr>
+          <p:cNvSpPr>
+            <a:spLocks noChangeAspect="1"/>
+          </p:cNvSpPr>
+          <p:nvPr/>
+        </p:nvSpPr>
+        <p:spPr>
+          <a:xfrm>
+            <a:off x="4624841" y="2081211"/>
+            <a:ext cx="91440" cy="91440"/>
+          </a:xfrm>
+          <a:prstGeom prst="ellipse">
+            <a:avLst/>
+          </a:prstGeom>
+          <a:solidFill>
+            <a:schemeClr val="accent4"/>
+          </a:solidFill>
+          <a:ln>
+            <a:noFill/>
+          </a:ln>
+        </p:spPr>
+        <p:style>
+          <a:lnRef idx="0">
+            <a:scrgbClr r="0" g="0" b="0"/>
+          </a:lnRef>
+          <a:fillRef idx="0">
+            <a:scrgbClr r="0" g="0" b="0"/>
+          </a:fillRef>
+          <a:effectRef idx="0">
+            <a:scrgbClr r="0" g="0" b="0"/>
+          </a:effectRef>
+          <a:fontRef idx="minor">
+            <a:schemeClr val="lt1"/>
+          </a:fontRef>
+        </p:style>
+        <p:txBody>
+          <a:bodyPr rtlCol="0" anchor="ctr"/>
+          <a:lstStyle/>
+          <a:p>
+            <a:pPr algn="ctr"/>
+            <a:endParaRPr lang="en-US"/>
+          </a:p>
+        </p:txBody>
+      </p:sp>
+      <p:sp>
+        <p:nvSpPr>
+          <p:cNvPr id="55" name="Oval 54">
+            <a:extLst>
+              <a:ext uri="{FF2B5EF4-FFF2-40B4-BE49-F238E27FC236}">
+                <a16:creationId xmlns:a16="http://schemas.microsoft.com/office/drawing/2014/main" id="{7F667DC1-CAE0-4ECF-A351-F3E62382712F}"/>
+              </a:ext>
+            </a:extLst>
+          </p:cNvPr>
+          <p:cNvSpPr>
+            <a:spLocks noChangeAspect="1"/>
+          </p:cNvSpPr>
+          <p:nvPr/>
+        </p:nvSpPr>
+        <p:spPr>
+          <a:xfrm>
+            <a:off x="6150954" y="4186395"/>
+            <a:ext cx="91440" cy="91440"/>
+          </a:xfrm>
+          <a:prstGeom prst="ellipse">
+            <a:avLst/>
+          </a:prstGeom>
+          <a:solidFill>
+            <a:schemeClr val="accent4"/>
+          </a:solidFill>
+          <a:ln>
+            <a:noFill/>
+          </a:ln>
+        </p:spPr>
+        <p:style>
+          <a:lnRef idx="0">
+            <a:scrgbClr r="0" g="0" b="0"/>
+          </a:lnRef>
+          <a:fillRef idx="0">
+            <a:scrgbClr r="0" g="0" b="0"/>
+          </a:fillRef>
+          <a:effectRef idx="0">
+            <a:scrgbClr r="0" g="0" b="0"/>
+          </a:effectRef>
+          <a:fontRef idx="minor">
+            <a:schemeClr val="lt1"/>
+          </a:fontRef>
+        </p:style>
+        <p:txBody>
+          <a:bodyPr rtlCol="0" anchor="ctr"/>
+          <a:lstStyle/>
+          <a:p>
+            <a:pPr algn="ctr"/>
+            <a:endParaRPr lang="en-US"/>
+          </a:p>
+        </p:txBody>
+      </p:sp>
+      <p:sp>
+        <p:nvSpPr>
+          <p:cNvPr id="56" name="TextBox 55">
+            <a:extLst>
+              <a:ext uri="{FF2B5EF4-FFF2-40B4-BE49-F238E27FC236}">
+                <a16:creationId xmlns:a16="http://schemas.microsoft.com/office/drawing/2014/main" id="{18A54CF0-E82C-4048-A0E2-7BF1E5A3895F}"/>
+              </a:ext>
+            </a:extLst>
+          </p:cNvPr>
+          <p:cNvSpPr txBox="1"/>
+          <p:nvPr/>
+        </p:nvSpPr>
+        <p:spPr>
+          <a:xfrm>
+            <a:off x="2381886" y="1006791"/>
+            <a:ext cx="990977" cy="369332"/>
+          </a:xfrm>
+          <a:prstGeom prst="rect">
+            <a:avLst/>
+          </a:prstGeom>
+          <a:noFill/>
+        </p:spPr>
+        <p:txBody>
+          <a:bodyPr wrap="none" rtlCol="0">
+            <a:spAutoFit/>
+          </a:bodyPr>
+          <a:lstStyle/>
+          <a:p>
+            <a:r>
+              <a:rPr lang="en-US" dirty="0">
+                <a:solidFill>
+                  <a:schemeClr val="accent6"/>
+                </a:solidFill>
+                <a:latin typeface="Noto Serif" panose="02020502060505020204" pitchFamily="18"/>
+                <a:ea typeface="Noto Serif" panose="02020502060505020204" pitchFamily="18"/>
+                <a:cs typeface="Noto Serif" panose="02020502060505020204" pitchFamily="18"/>
+              </a:rPr>
+              <a:t>layup 1</a:t>
+            </a:r>
+          </a:p>
+        </p:txBody>
+      </p:sp>
+      <p:cxnSp>
+        <p:nvCxnSpPr>
+          <p:cNvPr id="61" name="Straight Arrow Connector 60">
+            <a:extLst>
+              <a:ext uri="{FF2B5EF4-FFF2-40B4-BE49-F238E27FC236}">
+                <a16:creationId xmlns:a16="http://schemas.microsoft.com/office/drawing/2014/main" id="{E9606EC3-37CB-46F0-81F5-45EB862D08CE}"/>
+              </a:ext>
+            </a:extLst>
+          </p:cNvPr>
+          <p:cNvCxnSpPr>
+            <a:cxnSpLocks/>
+            <a:stCxn id="56" idx="3"/>
+          </p:cNvCxnSpPr>
+          <p:nvPr/>
+        </p:nvCxnSpPr>
+        <p:spPr>
+          <a:xfrm>
+            <a:off x="3372863" y="1191457"/>
+            <a:ext cx="1151512" cy="286625"/>
+          </a:xfrm>
+          <a:prstGeom prst="straightConnector1">
+            <a:avLst/>
+          </a:prstGeom>
+          <a:ln>
+            <a:tailEnd type="triangle"/>
+          </a:ln>
+        </p:spPr>
+        <p:style>
+          <a:lnRef idx="1">
+            <a:schemeClr val="accent6"/>
+          </a:lnRef>
+          <a:fillRef idx="0">
+            <a:schemeClr val="accent6"/>
+          </a:fillRef>
+          <a:effectRef idx="0">
+            <a:schemeClr val="accent6"/>
+          </a:effectRef>
+          <a:fontRef idx="minor">
+            <a:schemeClr val="tx1"/>
+          </a:fontRef>
+        </p:style>
+      </p:cxnSp>
+      <p:sp>
+        <p:nvSpPr>
+          <p:cNvPr id="63" name="TextBox 62">
+            <a:extLst>
+              <a:ext uri="{FF2B5EF4-FFF2-40B4-BE49-F238E27FC236}">
+                <a16:creationId xmlns:a16="http://schemas.microsoft.com/office/drawing/2014/main" id="{BC55E08A-5D75-4D39-B104-4C87BADF6030}"/>
+              </a:ext>
+            </a:extLst>
+          </p:cNvPr>
+          <p:cNvSpPr txBox="1"/>
+          <p:nvPr/>
+        </p:nvSpPr>
+        <p:spPr>
+          <a:xfrm>
+            <a:off x="2381886" y="1444923"/>
+            <a:ext cx="990977" cy="369332"/>
+          </a:xfrm>
+          <a:prstGeom prst="rect">
+            <a:avLst/>
+          </a:prstGeom>
+          <a:noFill/>
+        </p:spPr>
+        <p:txBody>
+          <a:bodyPr wrap="none" rtlCol="0">
+            <a:spAutoFit/>
+          </a:bodyPr>
+          <a:lstStyle/>
+          <a:p>
+            <a:r>
+              <a:rPr lang="en-US" dirty="0">
+                <a:solidFill>
+                  <a:schemeClr val="accent2"/>
+                </a:solidFill>
+                <a:latin typeface="Noto Serif" panose="02020502060505020204" pitchFamily="18"/>
+                <a:ea typeface="Noto Serif" panose="02020502060505020204" pitchFamily="18"/>
+                <a:cs typeface="Noto Serif" panose="02020502060505020204" pitchFamily="18"/>
+              </a:rPr>
+              <a:t>layup 2</a:t>
+            </a:r>
+          </a:p>
+        </p:txBody>
+      </p:sp>
+      <p:sp>
+        <p:nvSpPr>
+          <p:cNvPr id="64" name="TextBox 63">
+            <a:extLst>
+              <a:ext uri="{FF2B5EF4-FFF2-40B4-BE49-F238E27FC236}">
+                <a16:creationId xmlns:a16="http://schemas.microsoft.com/office/drawing/2014/main" id="{1FB96691-7874-4294-95A7-4769E2EB099B}"/>
+              </a:ext>
+            </a:extLst>
+          </p:cNvPr>
+          <p:cNvSpPr txBox="1"/>
+          <p:nvPr/>
+        </p:nvSpPr>
+        <p:spPr>
+          <a:xfrm>
+            <a:off x="2382648" y="1883055"/>
+            <a:ext cx="990977" cy="369332"/>
+          </a:xfrm>
+          <a:prstGeom prst="rect">
+            <a:avLst/>
+          </a:prstGeom>
+          <a:noFill/>
+        </p:spPr>
+        <p:txBody>
+          <a:bodyPr wrap="none" rtlCol="0">
+            <a:spAutoFit/>
+          </a:bodyPr>
+          <a:lstStyle/>
+          <a:p>
+            <a:r>
+              <a:rPr lang="en-US" dirty="0">
+                <a:solidFill>
+                  <a:schemeClr val="accent5"/>
+                </a:solidFill>
+                <a:latin typeface="Noto Serif" panose="02020502060505020204" pitchFamily="18"/>
+                <a:ea typeface="Noto Serif" panose="02020502060505020204" pitchFamily="18"/>
+                <a:cs typeface="Noto Serif" panose="02020502060505020204" pitchFamily="18"/>
+              </a:rPr>
+              <a:t>layup 3</a:t>
+            </a:r>
+          </a:p>
+        </p:txBody>
+      </p:sp>
+      <p:cxnSp>
+        <p:nvCxnSpPr>
+          <p:cNvPr id="66" name="Straight Arrow Connector 65">
+            <a:extLst>
+              <a:ext uri="{FF2B5EF4-FFF2-40B4-BE49-F238E27FC236}">
+                <a16:creationId xmlns:a16="http://schemas.microsoft.com/office/drawing/2014/main" id="{E4D41825-0191-4EDE-9D55-7CAA12E110D7}"/>
+              </a:ext>
+            </a:extLst>
+          </p:cNvPr>
+          <p:cNvCxnSpPr>
+            <a:cxnSpLocks/>
+            <a:stCxn id="63" idx="3"/>
+          </p:cNvCxnSpPr>
+          <p:nvPr/>
+        </p:nvCxnSpPr>
+        <p:spPr>
+          <a:xfrm>
+            <a:off x="3372863" y="1629589"/>
+            <a:ext cx="1018162" cy="237311"/>
+          </a:xfrm>
+          <a:prstGeom prst="straightConnector1">
+            <a:avLst/>
+          </a:prstGeom>
+          <a:ln>
+            <a:tailEnd type="triangle"/>
+          </a:ln>
+        </p:spPr>
+        <p:style>
+          <a:lnRef idx="1">
+            <a:schemeClr val="accent2"/>
+          </a:lnRef>
+          <a:fillRef idx="0">
+            <a:schemeClr val="accent2"/>
+          </a:fillRef>
+          <a:effectRef idx="0">
+            <a:schemeClr val="accent2"/>
+          </a:effectRef>
+          <a:fontRef idx="minor">
+            <a:schemeClr val="tx1"/>
+          </a:fontRef>
+        </p:style>
+      </p:cxnSp>
+      <p:cxnSp>
+        <p:nvCxnSpPr>
+          <p:cNvPr id="68" name="Straight Arrow Connector 67">
+            <a:extLst>
+              <a:ext uri="{FF2B5EF4-FFF2-40B4-BE49-F238E27FC236}">
+                <a16:creationId xmlns:a16="http://schemas.microsoft.com/office/drawing/2014/main" id="{8A8720A1-14EA-4BDF-ABC7-F197AD2CB9C2}"/>
+              </a:ext>
+            </a:extLst>
+          </p:cNvPr>
+          <p:cNvCxnSpPr>
+            <a:cxnSpLocks/>
+            <a:stCxn id="64" idx="3"/>
+          </p:cNvCxnSpPr>
+          <p:nvPr/>
+        </p:nvCxnSpPr>
+        <p:spPr>
+          <a:xfrm>
+            <a:off x="3373625" y="2067721"/>
+            <a:ext cx="998350" cy="218279"/>
+          </a:xfrm>
+          <a:prstGeom prst="straightConnector1">
+            <a:avLst/>
+          </a:prstGeom>
+          <a:ln>
+            <a:tailEnd type="triangle"/>
+          </a:ln>
+        </p:spPr>
+        <p:style>
+          <a:lnRef idx="1">
+            <a:schemeClr val="accent1"/>
+          </a:lnRef>
+          <a:fillRef idx="0">
+            <a:schemeClr val="accent1"/>
+          </a:fillRef>
+          <a:effectRef idx="0">
+            <a:schemeClr val="accent1"/>
+          </a:effectRef>
+          <a:fontRef idx="minor">
+            <a:schemeClr val="tx1"/>
+          </a:fontRef>
+        </p:style>
+      </p:cxnSp>
+      <p:sp>
+        <p:nvSpPr>
+          <p:cNvPr id="71" name="TextBox 70">
+            <a:extLst>
+              <a:ext uri="{FF2B5EF4-FFF2-40B4-BE49-F238E27FC236}">
+                <a16:creationId xmlns:a16="http://schemas.microsoft.com/office/drawing/2014/main" id="{E18D65F1-5BC5-4EA1-B495-1C7429B6602F}"/>
+              </a:ext>
+            </a:extLst>
+          </p:cNvPr>
+          <p:cNvSpPr txBox="1"/>
+          <p:nvPr/>
+        </p:nvSpPr>
+        <p:spPr>
+          <a:xfrm>
+            <a:off x="2382899" y="2321187"/>
+            <a:ext cx="990977" cy="369332"/>
+          </a:xfrm>
+          <a:prstGeom prst="rect">
+            <a:avLst/>
+          </a:prstGeom>
+          <a:noFill/>
+        </p:spPr>
+        <p:txBody>
+          <a:bodyPr wrap="none" rtlCol="0">
+            <a:spAutoFit/>
+          </a:bodyPr>
+          <a:lstStyle/>
+          <a:p>
+            <a:r>
+              <a:rPr lang="en-US" dirty="0">
+                <a:solidFill>
+                  <a:schemeClr val="accent4"/>
+                </a:solidFill>
+                <a:latin typeface="Noto Serif" panose="02020502060505020204" pitchFamily="18"/>
+                <a:ea typeface="Noto Serif" panose="02020502060505020204" pitchFamily="18"/>
+                <a:cs typeface="Noto Serif" panose="02020502060505020204" pitchFamily="18"/>
+              </a:rPr>
+              <a:t>layup 4</a:t>
+            </a:r>
+          </a:p>
+        </p:txBody>
+      </p:sp>
+      <p:cxnSp>
+        <p:nvCxnSpPr>
+          <p:cNvPr id="73" name="Straight Arrow Connector 72">
+            <a:extLst>
+              <a:ext uri="{FF2B5EF4-FFF2-40B4-BE49-F238E27FC236}">
+                <a16:creationId xmlns:a16="http://schemas.microsoft.com/office/drawing/2014/main" id="{076276DE-E329-4028-85EF-268C97AD2FDF}"/>
+              </a:ext>
+            </a:extLst>
+          </p:cNvPr>
+          <p:cNvCxnSpPr>
+            <a:stCxn id="71" idx="3"/>
+          </p:cNvCxnSpPr>
+          <p:nvPr/>
+        </p:nvCxnSpPr>
+        <p:spPr>
+          <a:xfrm>
+            <a:off x="3373876" y="2505853"/>
+            <a:ext cx="1017149" cy="184666"/>
+          </a:xfrm>
+          <a:prstGeom prst="straightConnector1">
+            <a:avLst/>
+          </a:prstGeom>
+          <a:ln>
+            <a:tailEnd type="triangle"/>
+          </a:ln>
+        </p:spPr>
+        <p:style>
+          <a:lnRef idx="1">
+            <a:schemeClr val="accent4"/>
+          </a:lnRef>
+          <a:fillRef idx="0">
+            <a:schemeClr val="accent4"/>
+          </a:fillRef>
+          <a:effectRef idx="0">
+            <a:schemeClr val="accent4"/>
+          </a:effectRef>
+          <a:fontRef idx="minor">
+            <a:schemeClr val="tx1"/>
+          </a:fontRef>
+        </p:style>
+      </p:cxnSp>
+      <p:sp>
+        <p:nvSpPr>
+          <p:cNvPr id="77" name="TextBox 76">
+            <a:extLst>
+              <a:ext uri="{FF2B5EF4-FFF2-40B4-BE49-F238E27FC236}">
+                <a16:creationId xmlns:a16="http://schemas.microsoft.com/office/drawing/2014/main" id="{ECD6615F-CA1F-4A46-B96B-1D46B01E1419}"/>
+              </a:ext>
+            </a:extLst>
+          </p:cNvPr>
+          <p:cNvSpPr txBox="1"/>
+          <p:nvPr/>
+        </p:nvSpPr>
+        <p:spPr>
+          <a:xfrm>
+            <a:off x="7991953" y="2773142"/>
+            <a:ext cx="646331" cy="307777"/>
+          </a:xfrm>
+          <a:prstGeom prst="rect">
+            <a:avLst/>
+          </a:prstGeom>
+          <a:noFill/>
+        </p:spPr>
+        <p:txBody>
+          <a:bodyPr wrap="none" rtlCol="0">
+            <a:spAutoFit/>
+          </a:bodyPr>
+          <a:lstStyle/>
+          <a:p>
+            <a:r>
+              <a:rPr lang="en-US" sz="1400" dirty="0">
+                <a:latin typeface="Noto Serif" panose="02020502060505020204" pitchFamily="18"/>
+                <a:ea typeface="Noto Serif" panose="02020502060505020204" pitchFamily="18"/>
+                <a:cs typeface="Noto Serif" panose="02020502060505020204" pitchFamily="18"/>
+              </a:rPr>
+              <a:t>-1/0/1</a:t>
+            </a:r>
+          </a:p>
+        </p:txBody>
+      </p:sp>
+      <p:sp>
+        <p:nvSpPr>
+          <p:cNvPr id="78" name="TextBox 77">
+            <a:extLst>
+              <a:ext uri="{FF2B5EF4-FFF2-40B4-BE49-F238E27FC236}">
+                <a16:creationId xmlns:a16="http://schemas.microsoft.com/office/drawing/2014/main" id="{67B68C96-DC83-4E39-A4DB-12131DFA66D2}"/>
+              </a:ext>
+            </a:extLst>
+          </p:cNvPr>
+          <p:cNvSpPr txBox="1"/>
+          <p:nvPr/>
+        </p:nvSpPr>
+        <p:spPr>
+          <a:xfrm>
+            <a:off x="6327911" y="1218723"/>
+            <a:ext cx="431528" cy="307777"/>
+          </a:xfrm>
+          <a:prstGeom prst="rect">
+            <a:avLst/>
+          </a:prstGeom>
+          <a:noFill/>
+        </p:spPr>
+        <p:txBody>
+          <a:bodyPr wrap="none" rtlCol="0">
+            <a:spAutoFit/>
+          </a:bodyPr>
+          <a:lstStyle/>
+          <a:p>
+            <a:r>
+              <a:rPr lang="en-US" sz="1400" dirty="0">
+                <a:solidFill>
+                  <a:schemeClr val="accent2"/>
+                </a:solidFill>
+                <a:latin typeface="Noto Serif" panose="02020502060505020204" pitchFamily="18"/>
+                <a:ea typeface="Noto Serif" panose="02020502060505020204" pitchFamily="18"/>
+                <a:cs typeface="Noto Serif" panose="02020502060505020204" pitchFamily="18"/>
+              </a:rPr>
+              <a:t>0.2</a:t>
+            </a:r>
+          </a:p>
+        </p:txBody>
+      </p:sp>
+      <p:sp>
+        <p:nvSpPr>
+          <p:cNvPr id="79" name="TextBox 78">
+            <a:extLst>
+              <a:ext uri="{FF2B5EF4-FFF2-40B4-BE49-F238E27FC236}">
+                <a16:creationId xmlns:a16="http://schemas.microsoft.com/office/drawing/2014/main" id="{4E0EB35B-AB2C-4C1F-BE56-DEC067149BD2}"/>
+              </a:ext>
+            </a:extLst>
+          </p:cNvPr>
+          <p:cNvSpPr txBox="1"/>
+          <p:nvPr/>
+        </p:nvSpPr>
+        <p:spPr>
+          <a:xfrm>
+            <a:off x="5776368" y="4481510"/>
+            <a:ext cx="532518" cy="307777"/>
+          </a:xfrm>
+          <a:prstGeom prst="rect">
+            <a:avLst/>
+          </a:prstGeom>
+          <a:noFill/>
+        </p:spPr>
+        <p:txBody>
+          <a:bodyPr wrap="none" rtlCol="0">
+            <a:spAutoFit/>
+          </a:bodyPr>
+          <a:lstStyle/>
+          <a:p>
+            <a:r>
+              <a:rPr lang="en-US" sz="1400" dirty="0">
+                <a:solidFill>
+                  <a:schemeClr val="accent2"/>
+                </a:solidFill>
+                <a:latin typeface="Noto Serif" panose="02020502060505020204" pitchFamily="18"/>
+                <a:ea typeface="Noto Serif" panose="02020502060505020204" pitchFamily="18"/>
+                <a:cs typeface="Noto Serif" panose="02020502060505020204" pitchFamily="18"/>
+              </a:rPr>
+              <a:t>0.75</a:t>
+            </a:r>
+          </a:p>
+        </p:txBody>
+      </p:sp>
+      <p:sp>
+        <p:nvSpPr>
+          <p:cNvPr id="80" name="TextBox 79">
+            <a:extLst>
+              <a:ext uri="{FF2B5EF4-FFF2-40B4-BE49-F238E27FC236}">
+                <a16:creationId xmlns:a16="http://schemas.microsoft.com/office/drawing/2014/main" id="{5AA6870B-2686-434E-9D9C-3E72DA64CE50}"/>
+              </a:ext>
+            </a:extLst>
+          </p:cNvPr>
+          <p:cNvSpPr txBox="1"/>
+          <p:nvPr/>
+        </p:nvSpPr>
+        <p:spPr>
+          <a:xfrm>
+            <a:off x="6560344" y="3570902"/>
+            <a:ext cx="487634" cy="307777"/>
+          </a:xfrm>
+          <a:prstGeom prst="rect">
+            <a:avLst/>
+          </a:prstGeom>
+          <a:noFill/>
+        </p:spPr>
+        <p:txBody>
+          <a:bodyPr wrap="none" rtlCol="0">
+            <a:spAutoFit/>
+          </a:bodyPr>
+          <a:lstStyle/>
+          <a:p>
+            <a:r>
+              <a:rPr lang="en-US" sz="1400" dirty="0">
+                <a:solidFill>
+                  <a:schemeClr val="accent5"/>
+                </a:solidFill>
+                <a:latin typeface="Noto Serif" panose="02020502060505020204" pitchFamily="18"/>
+                <a:ea typeface="Noto Serif" panose="02020502060505020204" pitchFamily="18"/>
+                <a:cs typeface="Noto Serif" panose="02020502060505020204" pitchFamily="18"/>
+              </a:rPr>
+              <a:t>-0.1</a:t>
+            </a:r>
+          </a:p>
+        </p:txBody>
+      </p:sp>
+      <p:sp>
+        <p:nvSpPr>
+          <p:cNvPr id="81" name="TextBox 80">
+            <a:extLst>
+              <a:ext uri="{FF2B5EF4-FFF2-40B4-BE49-F238E27FC236}">
+                <a16:creationId xmlns:a16="http://schemas.microsoft.com/office/drawing/2014/main" id="{AD099AAB-37D7-4852-B225-4DB3709CF737}"/>
+              </a:ext>
+            </a:extLst>
+          </p:cNvPr>
+          <p:cNvSpPr txBox="1"/>
+          <p:nvPr/>
+        </p:nvSpPr>
+        <p:spPr>
+          <a:xfrm>
+            <a:off x="4024330" y="2979861"/>
+            <a:ext cx="431528" cy="307777"/>
+          </a:xfrm>
+          <a:prstGeom prst="rect">
+            <a:avLst/>
+          </a:prstGeom>
+          <a:noFill/>
+        </p:spPr>
+        <p:txBody>
+          <a:bodyPr wrap="none" rtlCol="0">
+            <a:spAutoFit/>
+          </a:bodyPr>
+          <a:lstStyle/>
+          <a:p>
+            <a:r>
+              <a:rPr lang="en-US" sz="1400" dirty="0">
+                <a:solidFill>
+                  <a:schemeClr val="accent5"/>
+                </a:solidFill>
+                <a:latin typeface="Noto Serif" panose="02020502060505020204" pitchFamily="18"/>
+                <a:ea typeface="Noto Serif" panose="02020502060505020204" pitchFamily="18"/>
+                <a:cs typeface="Noto Serif" panose="02020502060505020204" pitchFamily="18"/>
+              </a:rPr>
+              <a:t>0.5</a:t>
+            </a:r>
+          </a:p>
+        </p:txBody>
+      </p:sp>
+      <p:sp>
+        <p:nvSpPr>
+          <p:cNvPr id="82" name="TextBox 81">
+            <a:extLst>
+              <a:ext uri="{FF2B5EF4-FFF2-40B4-BE49-F238E27FC236}">
+                <a16:creationId xmlns:a16="http://schemas.microsoft.com/office/drawing/2014/main" id="{309710E7-B296-44DB-AE37-E4FDFBC88F43}"/>
+              </a:ext>
+            </a:extLst>
+          </p:cNvPr>
+          <p:cNvSpPr txBox="1"/>
+          <p:nvPr/>
+        </p:nvSpPr>
+        <p:spPr>
+          <a:xfrm>
+            <a:off x="4624841" y="1850409"/>
+            <a:ext cx="487634" cy="307777"/>
+          </a:xfrm>
+          <a:prstGeom prst="rect">
+            <a:avLst/>
+          </a:prstGeom>
+          <a:noFill/>
+        </p:spPr>
+        <p:txBody>
+          <a:bodyPr wrap="none" rtlCol="0">
+            <a:spAutoFit/>
+          </a:bodyPr>
+          <a:lstStyle/>
+          <a:p>
+            <a:r>
+              <a:rPr lang="en-US" sz="1400" dirty="0">
+                <a:solidFill>
+                  <a:schemeClr val="accent4"/>
+                </a:solidFill>
+                <a:latin typeface="Noto Serif" panose="02020502060505020204" pitchFamily="18"/>
+                <a:ea typeface="Noto Serif" panose="02020502060505020204" pitchFamily="18"/>
+                <a:cs typeface="Noto Serif" panose="02020502060505020204" pitchFamily="18"/>
+              </a:rPr>
+              <a:t>-0.6</a:t>
+            </a:r>
+          </a:p>
+        </p:txBody>
+      </p:sp>
+      <p:sp>
+        <p:nvSpPr>
+          <p:cNvPr id="83" name="TextBox 82">
+            <a:extLst>
+              <a:ext uri="{FF2B5EF4-FFF2-40B4-BE49-F238E27FC236}">
+                <a16:creationId xmlns:a16="http://schemas.microsoft.com/office/drawing/2014/main" id="{EEE8ADDB-917C-4107-9D05-14094631197B}"/>
+              </a:ext>
+            </a:extLst>
+          </p:cNvPr>
+          <p:cNvSpPr txBox="1"/>
+          <p:nvPr/>
+        </p:nvSpPr>
+        <p:spPr>
+          <a:xfrm>
+            <a:off x="6121107" y="3955593"/>
+            <a:ext cx="487634" cy="307777"/>
+          </a:xfrm>
+          <a:prstGeom prst="rect">
+            <a:avLst/>
+          </a:prstGeom>
+          <a:noFill/>
+        </p:spPr>
+        <p:txBody>
+          <a:bodyPr wrap="none" rtlCol="0">
+            <a:spAutoFit/>
+          </a:bodyPr>
+          <a:lstStyle/>
+          <a:p>
+            <a:r>
+              <a:rPr lang="en-US" sz="1400" dirty="0">
+                <a:solidFill>
+                  <a:schemeClr val="accent4"/>
+                </a:solidFill>
+                <a:latin typeface="Noto Serif" panose="02020502060505020204" pitchFamily="18"/>
+                <a:ea typeface="Noto Serif" panose="02020502060505020204" pitchFamily="18"/>
+                <a:cs typeface="Noto Serif" panose="02020502060505020204" pitchFamily="18"/>
+              </a:rPr>
+              <a:t>-0.2</a:t>
+            </a:r>
+          </a:p>
+        </p:txBody>
+      </p:sp>
+      <p:sp>
+        <p:nvSpPr>
+          <p:cNvPr id="84" name="Arc 83">
+            <a:extLst>
+              <a:ext uri="{FF2B5EF4-FFF2-40B4-BE49-F238E27FC236}">
+                <a16:creationId xmlns:a16="http://schemas.microsoft.com/office/drawing/2014/main" id="{9EA8FB2E-DDE2-487D-A5AB-3BC8C3B46EBA}"/>
+              </a:ext>
+            </a:extLst>
+          </p:cNvPr>
+          <p:cNvSpPr>
+            <a:spLocks noChangeAspect="1"/>
+          </p:cNvSpPr>
+          <p:nvPr/>
+        </p:nvSpPr>
+        <p:spPr>
+          <a:xfrm>
+            <a:off x="3681410" y="823910"/>
+            <a:ext cx="4206240" cy="4206240"/>
+          </a:xfrm>
+          <a:prstGeom prst="arc">
+            <a:avLst>
+              <a:gd name="adj1" fmla="val 20134917"/>
+              <a:gd name="adj2" fmla="val 0"/>
+            </a:avLst>
+          </a:prstGeom>
+          <a:noFill/>
+          <a:ln w="19050" cap="flat" cmpd="sng" algn="ctr">
+            <a:solidFill>
+              <a:schemeClr val="dk1"/>
+            </a:solidFill>
+            <a:prstDash val="solid"/>
+            <a:round/>
+            <a:headEnd type="triangle" w="med" len="med"/>
+            <a:tailEnd type="none" w="med" len="med"/>
+          </a:ln>
+        </p:spPr>
+        <p:style>
+          <a:lnRef idx="0">
+            <a:scrgbClr r="0" g="0" b="0"/>
+          </a:lnRef>
+          <a:fillRef idx="0">
+            <a:scrgbClr r="0" g="0" b="0"/>
+          </a:fillRef>
+          <a:effectRef idx="0">
+            <a:scrgbClr r="0" g="0" b="0"/>
+          </a:effectRef>
+          <a:fontRef idx="minor">
+            <a:schemeClr val="dk1"/>
+          </a:fontRef>
+        </p:style>
+        <p:txBody>
+          <a:bodyPr rtlCol="0" anchor="ctr"/>
+          <a:lstStyle/>
+          <a:p>
+            <a:pPr algn="ctr"/>
+            <a:endParaRPr lang="en-US"/>
+          </a:p>
+        </p:txBody>
+      </p:sp>
+    </p:spTree>
+    <p:extLst>
+      <p:ext uri="{BB962C8B-B14F-4D97-AF65-F5344CB8AC3E}">
+        <p14:creationId xmlns:p14="http://schemas.microsoft.com/office/powerpoint/2010/main" val="2596301139"/>
+      </p:ext>
+    </p:extLst>
+  </p:cSld>
+  <p:clrMapOvr>
+    <a:masterClrMapping/>
+  </p:clrMapOvr>
+</p:sld>
+</file>
+
+<file path=ppt/slides/slide4.xml><?xml version="1.0" encoding="utf-8"?>
+<p:sld xmlns:a="http://schemas.openxmlformats.org/drawingml/2006/main" xmlns:r="http://schemas.openxmlformats.org/officeDocument/2006/relationships" xmlns:p="http://schemas.openxmlformats.org/presentationml/2006/main">
+  <p:cSld>
+    <p:spTree>
+      <p:nvGrpSpPr>
+        <p:cNvPr id="1" name=""/>
+        <p:cNvGrpSpPr/>
+        <p:nvPr/>
+      </p:nvGrpSpPr>
+      <p:grpSpPr>
+        <a:xfrm>
+          <a:off x="0" y="0"/>
+          <a:ext cx="0" cy="0"/>
+          <a:chOff x="0" y="0"/>
+          <a:chExt cx="0" cy="0"/>
+        </a:xfrm>
+      </p:grpSpPr>
+      <p:grpSp>
+        <p:nvGrpSpPr>
+          <p:cNvPr id="20" name="Group 19">
+            <a:extLst>
+              <a:ext uri="{FF2B5EF4-FFF2-40B4-BE49-F238E27FC236}">
+                <a16:creationId xmlns:a16="http://schemas.microsoft.com/office/drawing/2014/main" id="{500F92A2-B580-4829-88ED-BC5F9627CD68}"/>
+              </a:ext>
+            </a:extLst>
+          </p:cNvPr>
+          <p:cNvGrpSpPr/>
+          <p:nvPr/>
+        </p:nvGrpSpPr>
+        <p:grpSpPr>
+          <a:xfrm>
+            <a:off x="4260254" y="1333222"/>
+            <a:ext cx="3991532" cy="3982006"/>
+            <a:chOff x="4260254" y="1333222"/>
+            <a:chExt cx="3991532" cy="3982006"/>
+          </a:xfrm>
+        </p:grpSpPr>
+        <p:pic>
+          <p:nvPicPr>
+            <p:cNvPr id="16" name="Picture 15" descr="Diagram&#10;&#10;Description automatically generated">
+              <a:extLst>
+                <a:ext uri="{FF2B5EF4-FFF2-40B4-BE49-F238E27FC236}">
+                  <a16:creationId xmlns:a16="http://schemas.microsoft.com/office/drawing/2014/main" id="{90800EF2-0B6D-49C1-91EB-4856D5AADFCC}"/>
+                </a:ext>
+              </a:extLst>
+            </p:cNvPr>
+            <p:cNvPicPr>
+              <a:picLocks noChangeAspect="1"/>
+            </p:cNvPicPr>
+            <p:nvPr/>
+          </p:nvPicPr>
+          <p:blipFill>
+            <a:blip r:embed="rId2">
+              <a:extLst>
+                <a:ext uri="{BEBA8EAE-BF5A-486C-A8C5-ECC9F3942E4B}">
+                  <a14:imgProps xmlns:a14="http://schemas.microsoft.com/office/drawing/2010/main">
+                    <a14:imgLayer r:embed="rId3">
+                      <a14:imgEffect>
+                        <a14:saturation sat="0"/>
+                      </a14:imgEffect>
+                    </a14:imgLayer>
+                  </a14:imgProps>
+                </a:ext>
+                <a:ext uri="{28A0092B-C50C-407E-A947-70E740481C1C}">
+                  <a14:useLocalDpi xmlns:a14="http://schemas.microsoft.com/office/drawing/2010/main" val="0"/>
+                </a:ext>
+              </a:extLst>
+            </a:blip>
+            <a:stretch>
+              <a:fillRect/>
+            </a:stretch>
+          </p:blipFill>
+          <p:spPr>
+            <a:xfrm>
+              <a:off x="4260254" y="1333222"/>
+              <a:ext cx="3991532" cy="3982006"/>
+            </a:xfrm>
+            <a:prstGeom prst="rect">
+              <a:avLst/>
+            </a:prstGeom>
+          </p:spPr>
+        </p:pic>
+        <p:sp>
+          <p:nvSpPr>
+            <p:cNvPr id="8" name="Oval 7">
+              <a:extLst>
+                <a:ext uri="{FF2B5EF4-FFF2-40B4-BE49-F238E27FC236}">
+                  <a16:creationId xmlns:a16="http://schemas.microsoft.com/office/drawing/2014/main" id="{56FBDC26-DA53-4E18-B3DD-C0258841019E}"/>
+                </a:ext>
+              </a:extLst>
+            </p:cNvPr>
+            <p:cNvSpPr>
+              <a:spLocks noChangeAspect="1"/>
+            </p:cNvSpPr>
+            <p:nvPr/>
+          </p:nvSpPr>
+          <p:spPr>
+            <a:xfrm>
+              <a:off x="5238750" y="2295224"/>
+              <a:ext cx="91440" cy="91440"/>
+            </a:xfrm>
+            <a:prstGeom prst="ellipse">
+              <a:avLst/>
+            </a:prstGeom>
+            <a:solidFill>
+              <a:schemeClr val="accent1"/>
+            </a:solidFill>
+            <a:ln>
+              <a:noFill/>
+            </a:ln>
+          </p:spPr>
+          <p:style>
+            <a:lnRef idx="0">
+              <a:scrgbClr r="0" g="0" b="0"/>
+            </a:lnRef>
+            <a:fillRef idx="0">
+              <a:scrgbClr r="0" g="0" b="0"/>
+            </a:fillRef>
+            <a:effectRef idx="0">
+              <a:scrgbClr r="0" g="0" b="0"/>
+            </a:effectRef>
+            <a:fontRef idx="minor">
+              <a:schemeClr val="lt1"/>
+            </a:fontRef>
+          </p:style>
+          <p:txBody>
+            <a:bodyPr rtlCol="0" anchor="ctr"/>
+            <a:lstStyle/>
+            <a:p>
+              <a:pPr algn="ctr"/>
+              <a:endParaRPr lang="en-US"/>
+            </a:p>
+          </p:txBody>
+        </p:sp>
+        <p:sp>
+          <p:nvSpPr>
+            <p:cNvPr id="9" name="Oval 8">
+              <a:extLst>
+                <a:ext uri="{FF2B5EF4-FFF2-40B4-BE49-F238E27FC236}">
+                  <a16:creationId xmlns:a16="http://schemas.microsoft.com/office/drawing/2014/main" id="{5288CE3D-F5AB-48CE-8F52-E7004261589E}"/>
+                </a:ext>
+              </a:extLst>
+            </p:cNvPr>
+            <p:cNvSpPr>
+              <a:spLocks noChangeAspect="1"/>
+            </p:cNvSpPr>
+            <p:nvPr/>
+          </p:nvSpPr>
+          <p:spPr>
+            <a:xfrm>
+              <a:off x="7172325" y="2295224"/>
+              <a:ext cx="91440" cy="91440"/>
+            </a:xfrm>
+            <a:prstGeom prst="ellipse">
+              <a:avLst/>
+            </a:prstGeom>
+            <a:solidFill>
+              <a:schemeClr val="accent2"/>
+            </a:solidFill>
+            <a:ln>
+              <a:noFill/>
+            </a:ln>
+          </p:spPr>
+          <p:style>
+            <a:lnRef idx="0">
+              <a:scrgbClr r="0" g="0" b="0"/>
+            </a:lnRef>
+            <a:fillRef idx="0">
+              <a:scrgbClr r="0" g="0" b="0"/>
+            </a:fillRef>
+            <a:effectRef idx="0">
+              <a:scrgbClr r="0" g="0" b="0"/>
+            </a:effectRef>
+            <a:fontRef idx="minor">
+              <a:schemeClr val="lt1"/>
+            </a:fontRef>
+          </p:style>
+          <p:txBody>
+            <a:bodyPr rtlCol="0" anchor="ctr"/>
+            <a:lstStyle/>
+            <a:p>
+              <a:pPr algn="ctr"/>
+              <a:endParaRPr lang="en-US"/>
+            </a:p>
+          </p:txBody>
+        </p:sp>
+        <p:sp>
+          <p:nvSpPr>
+            <p:cNvPr id="10" name="Oval 9">
+              <a:extLst>
+                <a:ext uri="{FF2B5EF4-FFF2-40B4-BE49-F238E27FC236}">
+                  <a16:creationId xmlns:a16="http://schemas.microsoft.com/office/drawing/2014/main" id="{2C446F9F-8DDD-463F-841A-A91A736A8045}"/>
+                </a:ext>
+              </a:extLst>
+            </p:cNvPr>
+            <p:cNvSpPr>
+              <a:spLocks noChangeAspect="1"/>
+            </p:cNvSpPr>
+            <p:nvPr/>
+          </p:nvSpPr>
+          <p:spPr>
+            <a:xfrm>
+              <a:off x="6210300" y="4419299"/>
+              <a:ext cx="91440" cy="91440"/>
+            </a:xfrm>
+            <a:prstGeom prst="ellipse">
+              <a:avLst/>
+            </a:prstGeom>
+            <a:solidFill>
+              <a:schemeClr val="accent2"/>
+            </a:solidFill>
+            <a:ln>
+              <a:noFill/>
+            </a:ln>
+          </p:spPr>
+          <p:style>
+            <a:lnRef idx="0">
+              <a:scrgbClr r="0" g="0" b="0"/>
+            </a:lnRef>
+            <a:fillRef idx="0">
+              <a:scrgbClr r="0" g="0" b="0"/>
+            </a:fillRef>
+            <a:effectRef idx="0">
+              <a:scrgbClr r="0" g="0" b="0"/>
+            </a:effectRef>
+            <a:fontRef idx="minor">
+              <a:schemeClr val="lt1"/>
+            </a:fontRef>
+          </p:style>
+          <p:txBody>
+            <a:bodyPr rtlCol="0" anchor="ctr"/>
+            <a:lstStyle/>
+            <a:p>
+              <a:pPr algn="ctr"/>
+              <a:endParaRPr lang="en-US"/>
+            </a:p>
+          </p:txBody>
+        </p:sp>
+        <p:sp>
+          <p:nvSpPr>
+            <p:cNvPr id="12" name="TextBox 11">
+              <a:extLst>
+                <a:ext uri="{FF2B5EF4-FFF2-40B4-BE49-F238E27FC236}">
+                  <a16:creationId xmlns:a16="http://schemas.microsoft.com/office/drawing/2014/main" id="{C2C23217-D5F1-49C7-88D3-A32090AD3301}"/>
+                </a:ext>
+              </a:extLst>
+            </p:cNvPr>
+            <p:cNvSpPr txBox="1"/>
+            <p:nvPr/>
+          </p:nvSpPr>
+          <p:spPr>
+            <a:xfrm>
+              <a:off x="4872944" y="1971612"/>
+              <a:ext cx="365806" cy="400110"/>
+            </a:xfrm>
+            <a:prstGeom prst="rect">
+              <a:avLst/>
+            </a:prstGeom>
+            <a:noFill/>
+          </p:spPr>
+          <p:txBody>
+            <a:bodyPr wrap="none" rtlCol="0">
+              <a:spAutoFit/>
+            </a:bodyPr>
+            <a:lstStyle/>
+            <a:p>
+              <a:r>
+                <a:rPr lang="en-US" sz="2000" dirty="0">
+                  <a:latin typeface="Noto Serif" panose="02020502060505020204" pitchFamily="18"/>
+                  <a:ea typeface="Noto Serif" panose="02020502060505020204" pitchFamily="18"/>
+                  <a:cs typeface="Noto Serif" panose="02020502060505020204" pitchFamily="18"/>
+                </a:rPr>
+                <a:t>A</a:t>
+              </a:r>
+            </a:p>
+          </p:txBody>
+        </p:sp>
+        <p:sp>
+          <p:nvSpPr>
+            <p:cNvPr id="13" name="TextBox 12">
+              <a:extLst>
+                <a:ext uri="{FF2B5EF4-FFF2-40B4-BE49-F238E27FC236}">
+                  <a16:creationId xmlns:a16="http://schemas.microsoft.com/office/drawing/2014/main" id="{D664FB4C-D0BE-4536-9302-391C2769DE93}"/>
+                </a:ext>
+              </a:extLst>
+            </p:cNvPr>
+            <p:cNvSpPr txBox="1"/>
+            <p:nvPr/>
+          </p:nvSpPr>
+          <p:spPr>
+            <a:xfrm>
+              <a:off x="7218045" y="1971612"/>
+              <a:ext cx="352982" cy="400110"/>
+            </a:xfrm>
+            <a:prstGeom prst="rect">
+              <a:avLst/>
+            </a:prstGeom>
+            <a:noFill/>
+          </p:spPr>
+          <p:txBody>
+            <a:bodyPr wrap="none" rtlCol="0">
+              <a:spAutoFit/>
+            </a:bodyPr>
+            <a:lstStyle/>
+            <a:p>
+              <a:r>
+                <a:rPr lang="en-US" sz="2000" dirty="0">
+                  <a:latin typeface="Noto Serif" panose="02020502060505020204" pitchFamily="18"/>
+                  <a:ea typeface="Noto Serif" panose="02020502060505020204" pitchFamily="18"/>
+                  <a:cs typeface="Noto Serif" panose="02020502060505020204" pitchFamily="18"/>
+                </a:rPr>
+                <a:t>B</a:t>
+              </a:r>
+            </a:p>
+          </p:txBody>
+        </p:sp>
+        <p:sp>
+          <p:nvSpPr>
+            <p:cNvPr id="14" name="TextBox 13">
+              <a:extLst>
+                <a:ext uri="{FF2B5EF4-FFF2-40B4-BE49-F238E27FC236}">
+                  <a16:creationId xmlns:a16="http://schemas.microsoft.com/office/drawing/2014/main" id="{084DFED7-36BA-43C9-8C93-D2646C9F2F3F}"/>
+                </a:ext>
+              </a:extLst>
+            </p:cNvPr>
+            <p:cNvSpPr txBox="1"/>
+            <p:nvPr/>
+          </p:nvSpPr>
+          <p:spPr>
+            <a:xfrm>
+              <a:off x="6256020" y="4419299"/>
+              <a:ext cx="341760" cy="400110"/>
+            </a:xfrm>
+            <a:prstGeom prst="rect">
+              <a:avLst/>
+            </a:prstGeom>
+            <a:noFill/>
+          </p:spPr>
+          <p:txBody>
+            <a:bodyPr wrap="none" rtlCol="0">
+              <a:spAutoFit/>
+            </a:bodyPr>
+            <a:lstStyle/>
+            <a:p>
+              <a:r>
+                <a:rPr lang="en-US" sz="2000" dirty="0">
+                  <a:latin typeface="Noto Serif" panose="02020502060505020204" pitchFamily="18"/>
+                  <a:ea typeface="Noto Serif" panose="02020502060505020204" pitchFamily="18"/>
+                  <a:cs typeface="Noto Serif" panose="02020502060505020204" pitchFamily="18"/>
+                </a:rPr>
+                <a:t>C</a:t>
+              </a:r>
+            </a:p>
+          </p:txBody>
+        </p:sp>
+        <p:sp>
+          <p:nvSpPr>
+            <p:cNvPr id="18" name="TextBox 17">
+              <a:extLst>
+                <a:ext uri="{FF2B5EF4-FFF2-40B4-BE49-F238E27FC236}">
+                  <a16:creationId xmlns:a16="http://schemas.microsoft.com/office/drawing/2014/main" id="{CF767FDC-8090-4558-9EA1-E5CC412044DB}"/>
+                </a:ext>
+              </a:extLst>
+            </p:cNvPr>
+            <p:cNvSpPr txBox="1"/>
+            <p:nvPr/>
+          </p:nvSpPr>
+          <p:spPr>
+            <a:xfrm>
+              <a:off x="5543355" y="1661816"/>
+              <a:ext cx="1116011" cy="400110"/>
+            </a:xfrm>
+            <a:prstGeom prst="rect">
+              <a:avLst/>
+            </a:prstGeom>
+            <a:noFill/>
+          </p:spPr>
+          <p:txBody>
+            <a:bodyPr wrap="none" rtlCol="0">
+              <a:spAutoFit/>
+            </a:bodyPr>
+            <a:lstStyle/>
+            <a:p>
+              <a:r>
+                <a:rPr lang="en-US" sz="2000" i="1" dirty="0">
+                  <a:latin typeface="Noto Serif" panose="02020502060505020204" pitchFamily="18"/>
+                  <a:ea typeface="Noto Serif" panose="02020502060505020204" pitchFamily="18"/>
+                  <a:cs typeface="Noto Serif" panose="02020502060505020204" pitchFamily="18"/>
+                </a:rPr>
+                <a:t>filling 1</a:t>
+              </a:r>
+            </a:p>
+          </p:txBody>
+        </p:sp>
+        <p:sp>
+          <p:nvSpPr>
+            <p:cNvPr id="19" name="TextBox 18">
+              <a:extLst>
+                <a:ext uri="{FF2B5EF4-FFF2-40B4-BE49-F238E27FC236}">
+                  <a16:creationId xmlns:a16="http://schemas.microsoft.com/office/drawing/2014/main" id="{EA64742B-350B-41FD-AFF2-1C2D5B65E1C3}"/>
+                </a:ext>
+              </a:extLst>
+            </p:cNvPr>
+            <p:cNvSpPr txBox="1"/>
+            <p:nvPr/>
+          </p:nvSpPr>
+          <p:spPr>
+            <a:xfrm>
+              <a:off x="6836530" y="4619354"/>
+              <a:ext cx="1116011" cy="400110"/>
+            </a:xfrm>
+            <a:prstGeom prst="rect">
+              <a:avLst/>
+            </a:prstGeom>
+            <a:noFill/>
+          </p:spPr>
+          <p:txBody>
+            <a:bodyPr wrap="none" rtlCol="0">
+              <a:spAutoFit/>
+            </a:bodyPr>
+            <a:lstStyle/>
+            <a:p>
+              <a:r>
+                <a:rPr lang="en-US" sz="2000" i="1" dirty="0">
+                  <a:latin typeface="Noto Serif" panose="02020502060505020204" pitchFamily="18"/>
+                  <a:ea typeface="Noto Serif" panose="02020502060505020204" pitchFamily="18"/>
+                  <a:cs typeface="Noto Serif" panose="02020502060505020204" pitchFamily="18"/>
+                </a:rPr>
+                <a:t>filling 2</a:t>
+              </a:r>
+            </a:p>
+          </p:txBody>
+        </p:sp>
+      </p:grpSp>
     </p:spTree>
     <p:extLst>
       <p:ext uri="{BB962C8B-B14F-4D97-AF65-F5344CB8AC3E}">

</xml_diff>